<commit_message>
Resized images in module1
</commit_message>
<xml_diff>
--- a/basics1/results/getting-started.pptx
+++ b/basics1/results/getting-started.pptx
@@ -5,7 +5,7 @@
     <p:sldMasterId id="2147483648" r:id="rId1"/>
   </p:sldMasterIdLst>
   <p:notesMasterIdLst>
-    <p:NotesMasterId r:id="rId32"/>
+    <p:NotesMasterId r:id="rId33"/>
   </p:notesMasterIdLst>
   <p:sldIdLst>
     <p:sldId id="256" r:id="rId2"/>
@@ -38,6 +38,7 @@
     <p:sldId id="283" r:id="rId29"/>
     <p:sldId id="284" r:id="rId30"/>
     <p:sldId id="285" r:id="rId31"/>
+    <p:sldId id="286" r:id="rId32"/>
   </p:sldIdLst>
   <p:sldSz cx="9144000" cy="6858000" type="screen4x3"/>
   <p:notesSz cx="6858000" cy="9144000"/>
@@ -237,7 +238,7 @@
           <a:p>
             <a:fld id="{0F9C1CCF-B725-44A7-AA57-5E433BD85C9F}" type="datetimeFigureOut">
               <a:rPr lang="en-US" smtClean="0"/>
-              <a:t>2/17/2018</a:t>
+              <a:t>4/5/2019</a:t>
             </a:fld>
             <a:endParaRPr lang="en-US"/>
           </a:p>
@@ -1302,7 +1303,7 @@
           <a:p>
             <a:fld id="{18BDFEC3-8487-43E8-A154-7C12CBC1FFF2}" type="slidenum">
               <a:rPr lang="en-US"/>
-              <a:t>2</a:t>
+              <a:t>3</a:t>
             </a:fld>
             <a:endParaRPr lang="en-US"/>
           </a:p>
@@ -1672,7 +1673,7 @@
           <a:p>
             <a:fld id="{18BDFEC3-8487-43E8-A154-7C12CBC1FFF2}" type="slidenum">
               <a:rPr lang="en-US"/>
-              <a:t>11</a:t>
+              <a:t>12</a:t>
             </a:fld>
             <a:endParaRPr lang="en-US"/>
           </a:p>
@@ -2272,7 +2273,7 @@
           <a:p>
             <a:fld id="{18BDFEC3-8487-43E8-A154-7C12CBC1FFF2}" type="slidenum">
               <a:rPr lang="en-US"/>
-              <a:t>12</a:t>
+              <a:t>13</a:t>
             </a:fld>
             <a:endParaRPr lang="en-US"/>
           </a:p>
@@ -2482,7 +2483,7 @@
           <a:p>
             <a:fld id="{18BDFEC3-8487-43E8-A154-7C12CBC1FFF2}" type="slidenum">
               <a:rPr lang="en-US"/>
-              <a:t>13</a:t>
+              <a:t>14</a:t>
             </a:fld>
             <a:endParaRPr lang="en-US"/>
           </a:p>
@@ -2908,7 +2909,7 @@
           <a:p>
             <a:fld id="{18BDFEC3-8487-43E8-A154-7C12CBC1FFF2}" type="slidenum">
               <a:rPr lang="en-US"/>
-              <a:t>14</a:t>
+              <a:t>15</a:t>
             </a:fld>
             <a:endParaRPr lang="en-US"/>
           </a:p>
@@ -3222,7 +3223,7 @@
           <a:p>
             <a:fld id="{18BDFEC3-8487-43E8-A154-7C12CBC1FFF2}" type="slidenum">
               <a:rPr lang="en-US"/>
-              <a:t>15</a:t>
+              <a:t>16</a:t>
             </a:fld>
             <a:endParaRPr lang="en-US"/>
           </a:p>
@@ -3424,7 +3425,7 @@
           <a:p>
             <a:fld id="{18BDFEC3-8487-43E8-A154-7C12CBC1FFF2}" type="slidenum">
               <a:rPr lang="en-US"/>
-              <a:t>16</a:t>
+              <a:t>17</a:t>
             </a:fld>
             <a:endParaRPr lang="en-US"/>
           </a:p>
@@ -3578,7 +3579,7 @@
           <a:p>
             <a:fld id="{18BDFEC3-8487-43E8-A154-7C12CBC1FFF2}" type="slidenum">
               <a:rPr lang="en-US"/>
-              <a:t>17</a:t>
+              <a:t>18</a:t>
             </a:fld>
             <a:endParaRPr lang="en-US"/>
           </a:p>
@@ -4276,7 +4277,7 @@
           <a:p>
             <a:fld id="{18BDFEC3-8487-43E8-A154-7C12CBC1FFF2}" type="slidenum">
               <a:rPr lang="en-US"/>
-              <a:t>18</a:t>
+              <a:t>19</a:t>
             </a:fld>
             <a:endParaRPr lang="en-US"/>
           </a:p>
@@ -4886,7 +4887,7 @@
           <a:p>
             <a:fld id="{18BDFEC3-8487-43E8-A154-7C12CBC1FFF2}" type="slidenum">
               <a:rPr lang="en-US"/>
-              <a:t>19</a:t>
+              <a:t>20</a:t>
             </a:fld>
             <a:endParaRPr lang="en-US"/>
           </a:p>
@@ -5080,7 +5081,7 @@
           <a:p>
             <a:fld id="{18BDFEC3-8487-43E8-A154-7C12CBC1FFF2}" type="slidenum">
               <a:rPr lang="en-US"/>
-              <a:t>20</a:t>
+              <a:t>21</a:t>
             </a:fld>
             <a:endParaRPr lang="en-US"/>
           </a:p>
@@ -5314,7 +5315,7 @@
           <a:p>
             <a:fld id="{18BDFEC3-8487-43E8-A154-7C12CBC1FFF2}" type="slidenum">
               <a:rPr lang="en-US"/>
-              <a:t>3</a:t>
+              <a:t>4</a:t>
             </a:fld>
             <a:endParaRPr lang="en-US"/>
           </a:p>
@@ -5572,7 +5573,7 @@
           <a:p>
             <a:fld id="{18BDFEC3-8487-43E8-A154-7C12CBC1FFF2}" type="slidenum">
               <a:rPr lang="en-US"/>
-              <a:t>21</a:t>
+              <a:t>22</a:t>
             </a:fld>
             <a:endParaRPr lang="en-US"/>
           </a:p>
@@ -5946,7 +5947,7 @@
           <a:p>
             <a:fld id="{18BDFEC3-8487-43E8-A154-7C12CBC1FFF2}" type="slidenum">
               <a:rPr lang="en-US"/>
-              <a:t>22</a:t>
+              <a:t>23</a:t>
             </a:fld>
             <a:endParaRPr lang="en-US"/>
           </a:p>
@@ -6308,7 +6309,7 @@
           <a:p>
             <a:fld id="{18BDFEC3-8487-43E8-A154-7C12CBC1FFF2}" type="slidenum">
               <a:rPr lang="en-US"/>
-              <a:t>23</a:t>
+              <a:t>24</a:t>
             </a:fld>
             <a:endParaRPr lang="en-US"/>
           </a:p>
@@ -6706,7 +6707,7 @@
           <a:p>
             <a:fld id="{18BDFEC3-8487-43E8-A154-7C12CBC1FFF2}" type="slidenum">
               <a:rPr lang="en-US"/>
-              <a:t>24</a:t>
+              <a:t>25</a:t>
             </a:fld>
             <a:endParaRPr lang="en-US"/>
           </a:p>
@@ -7104,7 +7105,7 @@
           <a:p>
             <a:fld id="{18BDFEC3-8487-43E8-A154-7C12CBC1FFF2}" type="slidenum">
               <a:rPr lang="en-US"/>
-              <a:t>25</a:t>
+              <a:t>26</a:t>
             </a:fld>
             <a:endParaRPr lang="en-US"/>
           </a:p>
@@ -7370,7 +7371,7 @@
           <a:p>
             <a:fld id="{18BDFEC3-8487-43E8-A154-7C12CBC1FFF2}" type="slidenum">
               <a:rPr lang="en-US"/>
-              <a:t>26</a:t>
+              <a:t>27</a:t>
             </a:fld>
             <a:endParaRPr lang="en-US"/>
           </a:p>
@@ -7810,7 +7811,7 @@
           <a:p>
             <a:fld id="{18BDFEC3-8487-43E8-A154-7C12CBC1FFF2}" type="slidenum">
               <a:rPr lang="en-US"/>
-              <a:t>29</a:t>
+              <a:t>30</a:t>
             </a:fld>
             <a:endParaRPr lang="en-US"/>
           </a:p>
@@ -8386,7 +8387,7 @@
           <a:p>
             <a:fld id="{18BDFEC3-8487-43E8-A154-7C12CBC1FFF2}" type="slidenum">
               <a:rPr lang="en-US"/>
-              <a:t>30</a:t>
+              <a:t>31</a:t>
             </a:fld>
             <a:endParaRPr lang="en-US"/>
           </a:p>
@@ -8778,7 +8779,7 @@
           <a:p>
             <a:fld id="{18BDFEC3-8487-43E8-A154-7C12CBC1FFF2}" type="slidenum">
               <a:rPr lang="en-US"/>
-              <a:t>4</a:t>
+              <a:t>5</a:t>
             </a:fld>
             <a:endParaRPr lang="en-US"/>
           </a:p>
@@ -10016,7 +10017,7 @@
           <a:p>
             <a:fld id="{18BDFEC3-8487-43E8-A154-7C12CBC1FFF2}" type="slidenum">
               <a:rPr lang="en-US"/>
-              <a:t>5</a:t>
+              <a:t>6</a:t>
             </a:fld>
             <a:endParaRPr lang="en-US"/>
           </a:p>
@@ -10740,7 +10741,7 @@
           <a:p>
             <a:fld id="{18BDFEC3-8487-43E8-A154-7C12CBC1FFF2}" type="slidenum">
               <a:rPr lang="en-US"/>
-              <a:t>6</a:t>
+              <a:t>7</a:t>
             </a:fld>
             <a:endParaRPr lang="en-US"/>
           </a:p>
@@ -12042,7 +12043,7 @@
           <a:p>
             <a:fld id="{18BDFEC3-8487-43E8-A154-7C12CBC1FFF2}" type="slidenum">
               <a:rPr lang="en-US"/>
-              <a:t>7</a:t>
+              <a:t>8</a:t>
             </a:fld>
             <a:endParaRPr lang="en-US"/>
           </a:p>
@@ -12890,7 +12891,7 @@
           <a:p>
             <a:fld id="{18BDFEC3-8487-43E8-A154-7C12CBC1FFF2}" type="slidenum">
               <a:rPr lang="en-US"/>
-              <a:t>8</a:t>
+              <a:t>9</a:t>
             </a:fld>
             <a:endParaRPr lang="en-US"/>
           </a:p>
@@ -13148,7 +13149,7 @@
           <a:p>
             <a:fld id="{18BDFEC3-8487-43E8-A154-7C12CBC1FFF2}" type="slidenum">
               <a:rPr lang="en-US"/>
-              <a:t>9</a:t>
+              <a:t>10</a:t>
             </a:fld>
             <a:endParaRPr lang="en-US"/>
           </a:p>
@@ -13806,7 +13807,7 @@
           <a:p>
             <a:fld id="{18BDFEC3-8487-43E8-A154-7C12CBC1FFF2}" type="slidenum">
               <a:rPr lang="en-US"/>
-              <a:t>10</a:t>
+              <a:t>11</a:t>
             </a:fld>
             <a:endParaRPr lang="en-US"/>
           </a:p>
@@ -13998,7 +13999,7 @@
           <a:p>
             <a:fld id="{241EB5C9-1307-BA42-ABA2-0BC069CD8E7F}" type="datetimeFigureOut">
               <a:rPr lang="en-US" smtClean="0"/>
-              <a:t>2/17/2018</a:t>
+              <a:t>4/5/2019</a:t>
             </a:fld>
             <a:endParaRPr lang="en-US"/>
           </a:p>
@@ -14168,7 +14169,7 @@
           <a:p>
             <a:fld id="{241EB5C9-1307-BA42-ABA2-0BC069CD8E7F}" type="datetimeFigureOut">
               <a:rPr lang="en-US" smtClean="0"/>
-              <a:t>2/17/2018</a:t>
+              <a:t>4/5/2019</a:t>
             </a:fld>
             <a:endParaRPr lang="en-US"/>
           </a:p>
@@ -14348,7 +14349,7 @@
           <a:p>
             <a:fld id="{241EB5C9-1307-BA42-ABA2-0BC069CD8E7F}" type="datetimeFigureOut">
               <a:rPr lang="en-US" smtClean="0"/>
-              <a:t>2/17/2018</a:t>
+              <a:t>4/5/2019</a:t>
             </a:fld>
             <a:endParaRPr lang="en-US"/>
           </a:p>
@@ -14518,7 +14519,7 @@
           <a:p>
             <a:fld id="{241EB5C9-1307-BA42-ABA2-0BC069CD8E7F}" type="datetimeFigureOut">
               <a:rPr lang="en-US" smtClean="0"/>
-              <a:t>2/17/2018</a:t>
+              <a:t>4/5/2019</a:t>
             </a:fld>
             <a:endParaRPr lang="en-US"/>
           </a:p>
@@ -14764,7 +14765,7 @@
           <a:p>
             <a:fld id="{241EB5C9-1307-BA42-ABA2-0BC069CD8E7F}" type="datetimeFigureOut">
               <a:rPr lang="en-US" smtClean="0"/>
-              <a:t>2/17/2018</a:t>
+              <a:t>4/5/2019</a:t>
             </a:fld>
             <a:endParaRPr lang="en-US"/>
           </a:p>
@@ -15052,7 +15053,7 @@
           <a:p>
             <a:fld id="{241EB5C9-1307-BA42-ABA2-0BC069CD8E7F}" type="datetimeFigureOut">
               <a:rPr lang="en-US" smtClean="0"/>
-              <a:t>2/17/2018</a:t>
+              <a:t>4/5/2019</a:t>
             </a:fld>
             <a:endParaRPr lang="en-US"/>
           </a:p>
@@ -15474,7 +15475,7 @@
           <a:p>
             <a:fld id="{241EB5C9-1307-BA42-ABA2-0BC069CD8E7F}" type="datetimeFigureOut">
               <a:rPr lang="en-US" smtClean="0"/>
-              <a:t>2/17/2018</a:t>
+              <a:t>4/5/2019</a:t>
             </a:fld>
             <a:endParaRPr lang="en-US"/>
           </a:p>
@@ -15592,7 +15593,7 @@
           <a:p>
             <a:fld id="{241EB5C9-1307-BA42-ABA2-0BC069CD8E7F}" type="datetimeFigureOut">
               <a:rPr lang="en-US" smtClean="0"/>
-              <a:t>2/17/2018</a:t>
+              <a:t>4/5/2019</a:t>
             </a:fld>
             <a:endParaRPr lang="en-US"/>
           </a:p>
@@ -15687,7 +15688,7 @@
           <a:p>
             <a:fld id="{241EB5C9-1307-BA42-ABA2-0BC069CD8E7F}" type="datetimeFigureOut">
               <a:rPr lang="en-US" smtClean="0"/>
-              <a:t>2/17/2018</a:t>
+              <a:t>4/5/2019</a:t>
             </a:fld>
             <a:endParaRPr lang="en-US"/>
           </a:p>
@@ -15964,7 +15965,7 @@
           <a:p>
             <a:fld id="{241EB5C9-1307-BA42-ABA2-0BC069CD8E7F}" type="datetimeFigureOut">
               <a:rPr lang="en-US" smtClean="0"/>
-              <a:t>2/17/2018</a:t>
+              <a:t>4/5/2019</a:t>
             </a:fld>
             <a:endParaRPr lang="en-US"/>
           </a:p>
@@ -16217,7 +16218,7 @@
           <a:p>
             <a:fld id="{241EB5C9-1307-BA42-ABA2-0BC069CD8E7F}" type="datetimeFigureOut">
               <a:rPr lang="en-US" smtClean="0"/>
-              <a:t>2/17/2018</a:t>
+              <a:t>4/5/2019</a:t>
             </a:fld>
             <a:endParaRPr lang="en-US"/>
           </a:p>
@@ -16430,7 +16431,7 @@
           <a:p>
             <a:fld id="{241EB5C9-1307-BA42-ABA2-0BC069CD8E7F}" type="datetimeFigureOut">
               <a:rPr lang="en-US" smtClean="0"/>
-              <a:t>2/17/2018</a:t>
+              <a:t>4/5/2019</a:t>
             </a:fld>
             <a:endParaRPr lang="en-US"/>
           </a:p>
@@ -16925,6 +16926,102 @@
             </a:pPr>
             <a:r>
               <a:rPr/>
+              <a:t>SAS</a:t>
+            </a:r>
+            <a:r>
+              <a:rPr/>
+              <a:t> </a:t>
+            </a:r>
+            <a:r>
+              <a:rPr/>
+              <a:t>using</a:t>
+            </a:r>
+            <a:r>
+              <a:rPr/>
+              <a:t> </a:t>
+            </a:r>
+            <a:r>
+              <a:rPr/>
+              <a:t>SAS</a:t>
+            </a:r>
+            <a:r>
+              <a:rPr/>
+              <a:t> </a:t>
+            </a:r>
+            <a:r>
+              <a:rPr/>
+              <a:t>markdown</a:t>
+            </a:r>
+          </a:p>
+        </p:txBody>
+      </p:sp>
+      <p:sp>
+        <p:nvSpPr>
+          <p:cNvPr id="3" name="Content Placeholder 2"/>
+          <p:cNvSpPr>
+            <a:spLocks noGrp="1"/>
+          </p:cNvSpPr>
+          <p:nvPr>
+            <p:ph idx="1"/>
+          </p:nvPr>
+        </p:nvSpPr>
+        <p:spPr/>
+        <p:txBody>
+          <a:bodyPr/>
+          <a:lstStyle/>
+          <a:p>
+            <a:pPr lvl="0" marL="0" indent="0">
+              <a:buNone/>
+            </a:pPr>
+            <a:r>
+              <a:rPr/>
+              <a:t>[Screenshot of SAS markdown web page]</a:t>
+            </a:r>
+          </a:p>
+        </p:txBody>
+      </p:sp>
+    </p:spTree>
+  </p:cSld>
+</p:sld>
+</file>
+
+<file path=ppt/slides/slide11.xml><?xml version="1.0" encoding="utf-8"?>
+<p:sld xmlns:a="http://schemas.openxmlformats.org/drawingml/2006/main" xmlns:r="http://schemas.openxmlformats.org/officeDocument/2006/relationships" xmlns:p="http://schemas.openxmlformats.org/presentationml/2006/main">
+  <p:cSld>
+    <p:spTree>
+      <p:nvGrpSpPr>
+        <p:cNvPr id="1" name=""/>
+        <p:cNvGrpSpPr/>
+        <p:nvPr/>
+      </p:nvGrpSpPr>
+      <p:grpSpPr>
+        <a:xfrm>
+          <a:off x="0" y="0"/>
+          <a:ext cx="0" cy="0"/>
+          <a:chOff x="0" y="0"/>
+          <a:chExt cx="0" cy="0"/>
+        </a:xfrm>
+      </p:grpSpPr>
+      <p:sp>
+        <p:nvSpPr>
+          <p:cNvPr id="2" name="Title 1"/>
+          <p:cNvSpPr>
+            <a:spLocks noGrp="1"/>
+          </p:cNvSpPr>
+          <p:nvPr>
+            <p:ph type="title"/>
+          </p:nvPr>
+        </p:nvSpPr>
+        <p:spPr/>
+        <p:txBody>
+          <a:bodyPr/>
+          <a:lstStyle/>
+          <a:p>
+            <a:pPr lvl="0" marL="0" indent="0">
+              <a:buNone/>
+            </a:pPr>
+            <a:r>
+              <a:rPr/>
               <a:t>Opening</a:t>
             </a:r>
             <a:r>
@@ -17083,7 +17180,7 @@
 </p:sld>
 </file>
 
-<file path=ppt/slides/slide11.xml><?xml version="1.0" encoding="utf-8"?>
+<file path=ppt/slides/slide12.xml><?xml version="1.0" encoding="utf-8"?>
 <p:sld xmlns:a="http://schemas.openxmlformats.org/drawingml/2006/main" xmlns:r="http://schemas.openxmlformats.org/officeDocument/2006/relationships" xmlns:p="http://schemas.openxmlformats.org/presentationml/2006/main">
   <p:cSld>
     <p:spTree>
@@ -17286,7 +17383,7 @@
 </p:sld>
 </file>
 
-<file path=ppt/slides/slide12.xml><?xml version="1.0" encoding="utf-8"?>
+<file path=ppt/slides/slide13.xml><?xml version="1.0" encoding="utf-8"?>
 <p:sld xmlns:a="http://schemas.openxmlformats.org/drawingml/2006/main" xmlns:r="http://schemas.openxmlformats.org/officeDocument/2006/relationships" xmlns:p="http://schemas.openxmlformats.org/presentationml/2006/main">
   <p:cSld>
     <p:spTree>
@@ -17481,7 +17578,7 @@
 </p:sld>
 </file>
 
-<file path=ppt/slides/slide13.xml><?xml version="1.0" encoding="utf-8"?>
+<file path=ppt/slides/slide14.xml><?xml version="1.0" encoding="utf-8"?>
 <p:sld xmlns:a="http://schemas.openxmlformats.org/drawingml/2006/main" xmlns:r="http://schemas.openxmlformats.org/officeDocument/2006/relationships" xmlns:p="http://schemas.openxmlformats.org/presentationml/2006/main">
   <p:cSld>
     <p:spTree>
@@ -17581,7 +17678,7 @@
 </p:sld>
 </file>
 
-<file path=ppt/slides/slide14.xml><?xml version="1.0" encoding="utf-8"?>
+<file path=ppt/slides/slide15.xml><?xml version="1.0" encoding="utf-8"?>
 <p:sld xmlns:a="http://schemas.openxmlformats.org/drawingml/2006/main" xmlns:r="http://schemas.openxmlformats.org/officeDocument/2006/relationships" xmlns:p="http://schemas.openxmlformats.org/presentationml/2006/main">
   <p:cSld>
     <p:spTree>
@@ -17768,7 +17865,7 @@
 </p:sld>
 </file>
 
-<file path=ppt/slides/slide15.xml><?xml version="1.0" encoding="utf-8"?>
+<file path=ppt/slides/slide16.xml><?xml version="1.0" encoding="utf-8"?>
 <p:sld xmlns:a="http://schemas.openxmlformats.org/drawingml/2006/main" xmlns:r="http://schemas.openxmlformats.org/officeDocument/2006/relationships" xmlns:p="http://schemas.openxmlformats.org/presentationml/2006/main">
   <p:cSld>
     <p:spTree>
@@ -17971,118 +18068,6 @@
 </p:sld>
 </file>
 
-<file path=ppt/slides/slide16.xml><?xml version="1.0" encoding="utf-8"?>
-<p:sld xmlns:a="http://schemas.openxmlformats.org/drawingml/2006/main" xmlns:r="http://schemas.openxmlformats.org/officeDocument/2006/relationships" xmlns:p="http://schemas.openxmlformats.org/presentationml/2006/main">
-  <p:cSld>
-    <p:spTree>
-      <p:nvGrpSpPr>
-        <p:cNvPr id="1" name=""/>
-        <p:cNvGrpSpPr/>
-        <p:nvPr/>
-      </p:nvGrpSpPr>
-      <p:grpSpPr>
-        <a:xfrm>
-          <a:off x="0" y="0"/>
-          <a:ext cx="0" cy="0"/>
-          <a:chOff x="0" y="0"/>
-          <a:chExt cx="0" cy="0"/>
-        </a:xfrm>
-      </p:grpSpPr>
-      <p:sp>
-        <p:nvSpPr>
-          <p:cNvPr id="2" name="Title 1"/>
-          <p:cNvSpPr>
-            <a:spLocks noGrp="1"/>
-          </p:cNvSpPr>
-          <p:nvPr>
-            <p:ph type="title"/>
-          </p:nvPr>
-        </p:nvSpPr>
-        <p:spPr/>
-        <p:txBody>
-          <a:bodyPr/>
-          <a:lstStyle/>
-          <a:p>
-            <a:pPr lvl="0" marL="0" indent="0">
-              <a:buNone/>
-            </a:pPr>
-            <a:r>
-              <a:rPr/>
-              <a:t>Log</a:t>
-            </a:r>
-            <a:r>
-              <a:rPr/>
-              <a:t> </a:t>
-            </a:r>
-            <a:r>
-              <a:rPr/>
-              <a:t>messages</a:t>
-            </a:r>
-            <a:r>
-              <a:rPr/>
-              <a:t> </a:t>
-            </a:r>
-            <a:r>
-              <a:rPr/>
-              <a:t>(1</a:t>
-            </a:r>
-            <a:r>
-              <a:rPr/>
-              <a:t> </a:t>
-            </a:r>
-            <a:r>
-              <a:rPr/>
-              <a:t>of</a:t>
-            </a:r>
-            <a:r>
-              <a:rPr/>
-              <a:t> </a:t>
-            </a:r>
-            <a:r>
-              <a:rPr/>
-              <a:t>2)</a:t>
-            </a:r>
-          </a:p>
-        </p:txBody>
-      </p:sp>
-      <p:sp>
-        <p:nvSpPr>
-          <p:cNvPr id="3" name="Content Placeholder 2"/>
-          <p:cNvSpPr>
-            <a:spLocks noGrp="1"/>
-          </p:cNvSpPr>
-          <p:nvPr>
-            <p:ph idx="1"/>
-          </p:nvPr>
-        </p:nvSpPr>
-        <p:spPr/>
-        <p:txBody>
-          <a:bodyPr/>
-          <a:lstStyle/>
-          <a:p>
-            <a:pPr lvl="0" marL="1270000" indent="0">
-              <a:buNone/>
-            </a:pPr>
-            <a:r>
-              <a:rPr sz="1800">
-                <a:latin typeface="Courier"/>
-              </a:rPr>
-              <a:t>1    data test_example;
-2     input x y;
-3     cards;
-NOTE: The data set WORK.TEST_EXAMPLE has 3 observations and 2 variables.
-NOTE: DATA statement used (Total process time):
-      real time           0.51 seconds
-      cpu time            0.04 seconds</a:t>
-            </a:r>
-          </a:p>
-        </p:txBody>
-      </p:sp>
-    </p:spTree>
-  </p:cSld>
-</p:sld>
-</file>
-
 <file path=ppt/slides/slide17.xml><?xml version="1.0" encoding="utf-8"?>
 <p:sld xmlns:a="http://schemas.openxmlformats.org/drawingml/2006/main" xmlns:r="http://schemas.openxmlformats.org/officeDocument/2006/relationships" xmlns:p="http://schemas.openxmlformats.org/presentationml/2006/main">
   <p:cSld>
@@ -18136,7 +18121,7 @@
             </a:r>
             <a:r>
               <a:rPr/>
-              <a:t>(2</a:t>
+              <a:t>(1</a:t>
             </a:r>
             <a:r>
               <a:rPr/>
@@ -18179,15 +18164,13 @@
               <a:rPr sz="1800">
                 <a:latin typeface="Courier"/>
               </a:rPr>
-              <a:t>9    proc means data=test_example;
-10     var x y;
-11     title "Descriptive statistics";
-12   run;
-NOTE: Writing HTML Body file: sashtml.htm
-NOTE: There were 3 observations read from the data set WORK.TEST_EXAMPLE.
-NOTE: PROCEDURE MEANS used (Total process time):
-      real time           1.72 seconds
-      cpu time            0.20 seconds</a:t>
+              <a:t>1    data test_example;
+2     input x y;
+3     cards;
+NOTE: The data set WORK.TEST_EXAMPLE has 3 observations and 2 variables.
+NOTE: DATA statement used (Total process time):
+      real time           0.51 seconds
+      cpu time            0.04 seconds</a:t>
             </a:r>
           </a:p>
         </p:txBody>
@@ -18234,31 +18217,39 @@
             </a:pPr>
             <a:r>
               <a:rPr/>
-              <a:t>Where</a:t>
-            </a:r>
-            <a:r>
-              <a:rPr/>
-              <a:t> </a:t>
-            </a:r>
-            <a:r>
-              <a:rPr/>
-              <a:t>is</a:t>
-            </a:r>
-            <a:r>
-              <a:rPr/>
-              <a:t> </a:t>
-            </a:r>
-            <a:r>
-              <a:rPr/>
-              <a:t>the</a:t>
-            </a:r>
-            <a:r>
-              <a:rPr/>
-              <a:t> </a:t>
-            </a:r>
-            <a:r>
-              <a:rPr/>
-              <a:t>output?</a:t>
+              <a:t>Log</a:t>
+            </a:r>
+            <a:r>
+              <a:rPr/>
+              <a:t> </a:t>
+            </a:r>
+            <a:r>
+              <a:rPr/>
+              <a:t>messages</a:t>
+            </a:r>
+            <a:r>
+              <a:rPr/>
+              <a:t> </a:t>
+            </a:r>
+            <a:r>
+              <a:rPr/>
+              <a:t>(2</a:t>
+            </a:r>
+            <a:r>
+              <a:rPr/>
+              <a:t> </a:t>
+            </a:r>
+            <a:r>
+              <a:rPr/>
+              <a:t>of</a:t>
+            </a:r>
+            <a:r>
+              <a:rPr/>
+              <a:t> </a:t>
+            </a:r>
+            <a:r>
+              <a:rPr/>
+              <a:t>2)</a:t>
             </a:r>
           </a:p>
         </p:txBody>
@@ -18278,33 +18269,22 @@
           <a:bodyPr/>
           <a:lstStyle/>
           <a:p>
-            <a:pPr lvl="0" marL="0" indent="0">
+            <a:pPr lvl="0" marL="1270000" indent="0">
               <a:buNone/>
             </a:pPr>
             <a:r>
-              <a:rPr/>
-              <a:t>SAS has several options for storing output.</a:t>
-            </a:r>
-          </a:p>
-          <a:p>
-            <a:pPr lvl="1"/>
-            <a:r>
-              <a:rPr/>
-              <a:t>In the output window</a:t>
-            </a:r>
-          </a:p>
-          <a:p>
-            <a:pPr lvl="1"/>
-            <a:r>
-              <a:rPr/>
-              <a:t>As an html file</a:t>
-            </a:r>
-          </a:p>
-          <a:p>
-            <a:pPr lvl="1"/>
-            <a:r>
-              <a:rPr/>
-              <a:t>As a pdf file</a:t>
+              <a:rPr sz="1800">
+                <a:latin typeface="Courier"/>
+              </a:rPr>
+              <a:t>9    proc means data=test_example;
+10     var x y;
+11     title "Descriptive statistics";
+12   run;
+NOTE: Writing HTML Body file: sashtml.htm
+NOTE: There were 3 observations read from the data set WORK.TEST_EXAMPLE.
+NOTE: PROCEDURE MEANS used (Total process time):
+      real time           1.72 seconds
+      cpu time            0.20 seconds</a:t>
             </a:r>
           </a:p>
         </p:txBody>
@@ -18315,6 +18295,208 @@
 </file>
 
 <file path=ppt/slides/slide19.xml><?xml version="1.0" encoding="utf-8"?>
+<p:sld xmlns:a="http://schemas.openxmlformats.org/drawingml/2006/main" xmlns:r="http://schemas.openxmlformats.org/officeDocument/2006/relationships" xmlns:p="http://schemas.openxmlformats.org/presentationml/2006/main">
+  <p:cSld>
+    <p:spTree>
+      <p:nvGrpSpPr>
+        <p:cNvPr id="1" name=""/>
+        <p:cNvGrpSpPr/>
+        <p:nvPr/>
+      </p:nvGrpSpPr>
+      <p:grpSpPr>
+        <a:xfrm>
+          <a:off x="0" y="0"/>
+          <a:ext cx="0" cy="0"/>
+          <a:chOff x="0" y="0"/>
+          <a:chExt cx="0" cy="0"/>
+        </a:xfrm>
+      </p:grpSpPr>
+      <p:sp>
+        <p:nvSpPr>
+          <p:cNvPr id="2" name="Title 1"/>
+          <p:cNvSpPr>
+            <a:spLocks noGrp="1"/>
+          </p:cNvSpPr>
+          <p:nvPr>
+            <p:ph type="title"/>
+          </p:nvPr>
+        </p:nvSpPr>
+        <p:spPr/>
+        <p:txBody>
+          <a:bodyPr/>
+          <a:lstStyle/>
+          <a:p>
+            <a:pPr lvl="0" marL="0" indent="0">
+              <a:buNone/>
+            </a:pPr>
+            <a:r>
+              <a:rPr/>
+              <a:t>Where</a:t>
+            </a:r>
+            <a:r>
+              <a:rPr/>
+              <a:t> </a:t>
+            </a:r>
+            <a:r>
+              <a:rPr/>
+              <a:t>is</a:t>
+            </a:r>
+            <a:r>
+              <a:rPr/>
+              <a:t> </a:t>
+            </a:r>
+            <a:r>
+              <a:rPr/>
+              <a:t>the</a:t>
+            </a:r>
+            <a:r>
+              <a:rPr/>
+              <a:t> </a:t>
+            </a:r>
+            <a:r>
+              <a:rPr/>
+              <a:t>output?</a:t>
+            </a:r>
+          </a:p>
+        </p:txBody>
+      </p:sp>
+      <p:sp>
+        <p:nvSpPr>
+          <p:cNvPr id="3" name="Content Placeholder 2"/>
+          <p:cNvSpPr>
+            <a:spLocks noGrp="1"/>
+          </p:cNvSpPr>
+          <p:nvPr>
+            <p:ph idx="1"/>
+          </p:nvPr>
+        </p:nvSpPr>
+        <p:spPr/>
+        <p:txBody>
+          <a:bodyPr/>
+          <a:lstStyle/>
+          <a:p>
+            <a:pPr lvl="0" marL="0" indent="0">
+              <a:buNone/>
+            </a:pPr>
+            <a:r>
+              <a:rPr/>
+              <a:t>SAS has several options for storing output.</a:t>
+            </a:r>
+          </a:p>
+          <a:p>
+            <a:pPr lvl="1"/>
+            <a:r>
+              <a:rPr/>
+              <a:t>In the output window</a:t>
+            </a:r>
+          </a:p>
+          <a:p>
+            <a:pPr lvl="1"/>
+            <a:r>
+              <a:rPr/>
+              <a:t>As an html file</a:t>
+            </a:r>
+          </a:p>
+          <a:p>
+            <a:pPr lvl="1"/>
+            <a:r>
+              <a:rPr/>
+              <a:t>As a pdf file</a:t>
+            </a:r>
+          </a:p>
+        </p:txBody>
+      </p:sp>
+    </p:spTree>
+  </p:cSld>
+</p:sld>
+</file>
+
+<file path=ppt/slides/slide2.xml><?xml version="1.0" encoding="utf-8"?>
+<p:sld xmlns:a="http://schemas.openxmlformats.org/drawingml/2006/main" xmlns:r="http://schemas.openxmlformats.org/officeDocument/2006/relationships" xmlns:p="http://schemas.openxmlformats.org/presentationml/2006/main">
+  <p:cSld>
+    <p:spTree>
+      <p:nvGrpSpPr>
+        <p:cNvPr id="1" name=""/>
+        <p:cNvGrpSpPr/>
+        <p:nvPr/>
+      </p:nvGrpSpPr>
+      <p:grpSpPr>
+        <a:xfrm>
+          <a:off x="0" y="0"/>
+          <a:ext cx="0" cy="0"/>
+          <a:chOff x="0" y="0"/>
+          <a:chExt cx="0" cy="0"/>
+        </a:xfrm>
+      </p:grpSpPr>
+      <p:sp>
+        <p:nvSpPr>
+          <p:cNvPr id="2" name="Title 1"/>
+          <p:cNvSpPr>
+            <a:spLocks noGrp="1"/>
+          </p:cNvSpPr>
+          <p:nvPr>
+            <p:ph type="title"/>
+          </p:nvPr>
+        </p:nvSpPr>
+        <p:spPr/>
+        <p:txBody>
+          <a:bodyPr/>
+          <a:lstStyle/>
+          <a:p>
+            <a:pPr lvl="0" marL="0" indent="0">
+              <a:buNone/>
+            </a:pPr>
+            <a:r>
+              <a:rPr/>
+              <a:t>Test</a:t>
+            </a:r>
+            <a:r>
+              <a:rPr/>
+              <a:t> </a:t>
+            </a:r>
+            <a:r>
+              <a:rPr/>
+              <a:t>image</a:t>
+            </a:r>
+          </a:p>
+        </p:txBody>
+      </p:sp>
+      <p:pic>
+        <p:nvPicPr>
+          <p:cNvPr descr="../images/blog.png" id="0" name="Picture 1"/>
+          <p:cNvPicPr>
+            <a:picLocks noGrp="1" noChangeAspect="1"/>
+          </p:cNvPicPr>
+          <p:nvPr/>
+        </p:nvPicPr>
+        <p:blipFill>
+          <a:blip r:embed="rId2"/>
+          <a:stretch>
+            <a:fillRect/>
+          </a:stretch>
+        </p:blipFill>
+        <p:spPr bwMode="auto">
+          <a:xfrm>
+            <a:off x="1879600" y="1600200"/>
+            <a:ext cx="5384800" cy="4521200"/>
+          </a:xfrm>
+          <a:prstGeom prst="rect">
+            <a:avLst/>
+          </a:prstGeom>
+          <a:noFill/>
+          <a:ln w="9525">
+            <a:noFill/>
+            <a:headEnd/>
+            <a:tailEnd/>
+          </a:ln>
+        </p:spPr>
+      </p:pic>
+    </p:spTree>
+  </p:cSld>
+</p:sld>
+</file>
+
+<file path=ppt/slides/slide20.xml><?xml version="1.0" encoding="utf-8"?>
 <p:sld xmlns:a="http://schemas.openxmlformats.org/drawingml/2006/main" xmlns:r="http://schemas.openxmlformats.org/officeDocument/2006/relationships" xmlns:p="http://schemas.openxmlformats.org/presentationml/2006/main">
   <p:cSld>
     <p:spTree>
@@ -18445,89 +18627,7 @@
 </p:sld>
 </file>
 
-<file path=ppt/slides/slide2.xml><?xml version="1.0" encoding="utf-8"?>
-<p:sld xmlns:a="http://schemas.openxmlformats.org/drawingml/2006/main" xmlns:r="http://schemas.openxmlformats.org/officeDocument/2006/relationships" xmlns:p="http://schemas.openxmlformats.org/presentationml/2006/main">
-  <p:cSld>
-    <p:spTree>
-      <p:nvGrpSpPr>
-        <p:cNvPr id="1" name=""/>
-        <p:cNvGrpSpPr/>
-        <p:nvPr/>
-      </p:nvGrpSpPr>
-      <p:grpSpPr>
-        <a:xfrm>
-          <a:off x="0" y="0"/>
-          <a:ext cx="0" cy="0"/>
-          <a:chOff x="0" y="0"/>
-          <a:chExt cx="0" cy="0"/>
-        </a:xfrm>
-      </p:grpSpPr>
-      <p:sp>
-        <p:nvSpPr>
-          <p:cNvPr id="2" name="Title 1"/>
-          <p:cNvSpPr>
-            <a:spLocks noGrp="1"/>
-          </p:cNvSpPr>
-          <p:nvPr>
-            <p:ph type="title"/>
-          </p:nvPr>
-        </p:nvSpPr>
-        <p:spPr/>
-        <p:txBody>
-          <a:bodyPr/>
-          <a:lstStyle/>
-          <a:p>
-            <a:pPr lvl="0" marL="0" indent="0">
-              <a:buNone/>
-            </a:pPr>
-            <a:r>
-              <a:rPr/>
-              <a:t>Documentation</a:t>
-            </a:r>
-          </a:p>
-        </p:txBody>
-      </p:sp>
-      <p:sp>
-        <p:nvSpPr>
-          <p:cNvPr id="3" name="Content Placeholder 2"/>
-          <p:cNvSpPr>
-            <a:spLocks noGrp="1"/>
-          </p:cNvSpPr>
-          <p:nvPr>
-            <p:ph idx="1"/>
-          </p:nvPr>
-        </p:nvSpPr>
-        <p:spPr/>
-        <p:txBody>
-          <a:bodyPr/>
-          <a:lstStyle/>
-          <a:p>
-            <a:pPr lvl="0" marL="0" indent="0">
-              <a:buNone/>
-            </a:pPr>
-            <a:r>
-              <a:rPr/>
-              <a:t>This PowerPoint presentation was written by Steve Simon in 2018-08-29 and was last modified on 2019-08-12. It uses R Markdown, though the actual R code is fairly minimal. You can find the file that created this presentation on my </a:t>
-            </a:r>
-            <a:r>
-              <a:rPr>
-                <a:hlinkClick r:id="rId3"/>
-              </a:rPr>
-              <a:t>github repository</a:t>
-            </a:r>
-            <a:r>
-              <a:rPr/>
-              <a:t>.</a:t>
-            </a:r>
-          </a:p>
-        </p:txBody>
-      </p:sp>
-    </p:spTree>
-  </p:cSld>
-</p:sld>
-</file>
-
-<file path=ppt/slides/slide20.xml><?xml version="1.0" encoding="utf-8"?>
+<file path=ppt/slides/slide21.xml><?xml version="1.0" encoding="utf-8"?>
 <p:sld xmlns:a="http://schemas.openxmlformats.org/drawingml/2006/main" xmlns:r="http://schemas.openxmlformats.org/officeDocument/2006/relationships" xmlns:p="http://schemas.openxmlformats.org/presentationml/2006/main">
   <p:cSld>
     <p:spTree>
@@ -18690,7 +18790,7 @@
 </p:sld>
 </file>
 
-<file path=ppt/slides/slide21.xml><?xml version="1.0" encoding="utf-8"?>
+<file path=ppt/slides/slide22.xml><?xml version="1.0" encoding="utf-8"?>
 <p:sld xmlns:a="http://schemas.openxmlformats.org/drawingml/2006/main" xmlns:r="http://schemas.openxmlformats.org/officeDocument/2006/relationships" xmlns:p="http://schemas.openxmlformats.org/presentationml/2006/main">
   <p:cSld>
     <p:spTree>
@@ -18845,7 +18945,7 @@
 </p:sld>
 </file>
 
-<file path=ppt/slides/slide22.xml><?xml version="1.0" encoding="utf-8"?>
+<file path=ppt/slides/slide23.xml><?xml version="1.0" encoding="utf-8"?>
 <p:sld xmlns:a="http://schemas.openxmlformats.org/drawingml/2006/main" xmlns:r="http://schemas.openxmlformats.org/officeDocument/2006/relationships" xmlns:p="http://schemas.openxmlformats.org/presentationml/2006/main">
   <p:cSld>
     <p:spTree>
@@ -19088,7 +19188,7 @@
 </p:sld>
 </file>
 
-<file path=ppt/slides/slide23.xml><?xml version="1.0" encoding="utf-8"?>
+<file path=ppt/slides/slide24.xml><?xml version="1.0" encoding="utf-8"?>
 <p:sld xmlns:a="http://schemas.openxmlformats.org/drawingml/2006/main" xmlns:r="http://schemas.openxmlformats.org/officeDocument/2006/relationships" xmlns:p="http://schemas.openxmlformats.org/presentationml/2006/main">
   <p:cSld>
     <p:spTree>
@@ -19299,7 +19399,7 @@
 </p:sld>
 </file>
 
-<file path=ppt/slides/slide24.xml><?xml version="1.0" encoding="utf-8"?>
+<file path=ppt/slides/slide25.xml><?xml version="1.0" encoding="utf-8"?>
 <p:sld xmlns:a="http://schemas.openxmlformats.org/drawingml/2006/main" xmlns:r="http://schemas.openxmlformats.org/officeDocument/2006/relationships" xmlns:p="http://schemas.openxmlformats.org/presentationml/2006/main">
   <p:cSld>
     <p:spTree>
@@ -19510,7 +19610,7 @@
 </p:sld>
 </file>
 
-<file path=ppt/slides/slide25.xml><?xml version="1.0" encoding="utf-8"?>
+<file path=ppt/slides/slide26.xml><?xml version="1.0" encoding="utf-8"?>
 <p:sld xmlns:a="http://schemas.openxmlformats.org/drawingml/2006/main" xmlns:r="http://schemas.openxmlformats.org/officeDocument/2006/relationships" xmlns:p="http://schemas.openxmlformats.org/presentationml/2006/main">
   <p:cSld>
     <p:spTree>
@@ -19651,7 +19751,7 @@
 </p:sld>
 </file>
 
-<file path=ppt/slides/slide26.xml><?xml version="1.0" encoding="utf-8"?>
+<file path=ppt/slides/slide27.xml><?xml version="1.0" encoding="utf-8"?>
 <p:sld xmlns:a="http://schemas.openxmlformats.org/drawingml/2006/main" xmlns:r="http://schemas.openxmlformats.org/officeDocument/2006/relationships" xmlns:p="http://schemas.openxmlformats.org/presentationml/2006/main">
   <p:cSld>
     <p:spTree>
@@ -19806,7 +19906,7 @@
 </p:sld>
 </file>
 
-<file path=ppt/slides/slide27.xml><?xml version="1.0" encoding="utf-8"?>
+<file path=ppt/slides/slide28.xml><?xml version="1.0" encoding="utf-8"?>
 <p:sld xmlns:a="http://schemas.openxmlformats.org/drawingml/2006/main" xmlns:r="http://schemas.openxmlformats.org/officeDocument/2006/relationships" xmlns:p="http://schemas.openxmlformats.org/presentationml/2006/main">
   <p:cSld>
     <p:spTree>
@@ -19912,7 +20012,7 @@
 </p:sld>
 </file>
 
-<file path=ppt/slides/slide28.xml><?xml version="1.0" encoding="utf-8"?>
+<file path=ppt/slides/slide29.xml><?xml version="1.0" encoding="utf-8"?>
 <p:sld xmlns:a="http://schemas.openxmlformats.org/drawingml/2006/main" xmlns:r="http://schemas.openxmlformats.org/officeDocument/2006/relationships" xmlns:p="http://schemas.openxmlformats.org/presentationml/2006/main">
   <p:cSld>
     <p:spTree>
@@ -19959,7 +20059,89 @@
 </p:sld>
 </file>
 
-<file path=ppt/slides/slide29.xml><?xml version="1.0" encoding="utf-8"?>
+<file path=ppt/slides/slide3.xml><?xml version="1.0" encoding="utf-8"?>
+<p:sld xmlns:a="http://schemas.openxmlformats.org/drawingml/2006/main" xmlns:r="http://schemas.openxmlformats.org/officeDocument/2006/relationships" xmlns:p="http://schemas.openxmlformats.org/presentationml/2006/main">
+  <p:cSld>
+    <p:spTree>
+      <p:nvGrpSpPr>
+        <p:cNvPr id="1" name=""/>
+        <p:cNvGrpSpPr/>
+        <p:nvPr/>
+      </p:nvGrpSpPr>
+      <p:grpSpPr>
+        <a:xfrm>
+          <a:off x="0" y="0"/>
+          <a:ext cx="0" cy="0"/>
+          <a:chOff x="0" y="0"/>
+          <a:chExt cx="0" cy="0"/>
+        </a:xfrm>
+      </p:grpSpPr>
+      <p:sp>
+        <p:nvSpPr>
+          <p:cNvPr id="2" name="Title 1"/>
+          <p:cNvSpPr>
+            <a:spLocks noGrp="1"/>
+          </p:cNvSpPr>
+          <p:nvPr>
+            <p:ph type="title"/>
+          </p:nvPr>
+        </p:nvSpPr>
+        <p:spPr/>
+        <p:txBody>
+          <a:bodyPr/>
+          <a:lstStyle/>
+          <a:p>
+            <a:pPr lvl="0" marL="0" indent="0">
+              <a:buNone/>
+            </a:pPr>
+            <a:r>
+              <a:rPr/>
+              <a:t>Documentation</a:t>
+            </a:r>
+          </a:p>
+        </p:txBody>
+      </p:sp>
+      <p:sp>
+        <p:nvSpPr>
+          <p:cNvPr id="3" name="Content Placeholder 2"/>
+          <p:cNvSpPr>
+            <a:spLocks noGrp="1"/>
+          </p:cNvSpPr>
+          <p:nvPr>
+            <p:ph idx="1"/>
+          </p:nvPr>
+        </p:nvSpPr>
+        <p:spPr/>
+        <p:txBody>
+          <a:bodyPr/>
+          <a:lstStyle/>
+          <a:p>
+            <a:pPr lvl="0" marL="0" indent="0">
+              <a:buNone/>
+            </a:pPr>
+            <a:r>
+              <a:rPr/>
+              <a:t>This PowerPoint presentation was written by Steve Simon in 2018-08-29 and was last modified on 2020-06-26. It uses R Markdown, though the actual R code is fairly minimal. You can find the file that created this presentation on my </a:t>
+            </a:r>
+            <a:r>
+              <a:rPr>
+                <a:hlinkClick r:id="rId3"/>
+              </a:rPr>
+              <a:t>github repository</a:t>
+            </a:r>
+            <a:r>
+              <a:rPr/>
+              <a:t>.</a:t>
+            </a:r>
+          </a:p>
+        </p:txBody>
+      </p:sp>
+    </p:spTree>
+  </p:cSld>
+</p:sld>
+</file>
+
+<file path=ppt/slides/slide30.xml><?xml version="1.0" encoding="utf-8"?>
 <p:sld xmlns:a="http://schemas.openxmlformats.org/drawingml/2006/main" xmlns:r="http://schemas.openxmlformats.org/officeDocument/2006/relationships" xmlns:p="http://schemas.openxmlformats.org/presentationml/2006/main">
   <p:cSld>
     <p:spTree>
@@ -20106,108 +20288,7 @@
 </p:sld>
 </file>
 
-<file path=ppt/slides/slide3.xml><?xml version="1.0" encoding="utf-8"?>
-<p:sld xmlns:a="http://schemas.openxmlformats.org/drawingml/2006/main" xmlns:r="http://schemas.openxmlformats.org/officeDocument/2006/relationships" xmlns:p="http://schemas.openxmlformats.org/presentationml/2006/main">
-  <p:cSld>
-    <p:spTree>
-      <p:nvGrpSpPr>
-        <p:cNvPr id="1" name=""/>
-        <p:cNvGrpSpPr/>
-        <p:nvPr/>
-      </p:nvGrpSpPr>
-      <p:grpSpPr>
-        <a:xfrm>
-          <a:off x="0" y="0"/>
-          <a:ext cx="0" cy="0"/>
-          <a:chOff x="0" y="0"/>
-          <a:chExt cx="0" cy="0"/>
-        </a:xfrm>
-      </p:grpSpPr>
-      <p:sp>
-        <p:nvSpPr>
-          <p:cNvPr id="2" name="Title 1"/>
-          <p:cNvSpPr>
-            <a:spLocks noGrp="1"/>
-          </p:cNvSpPr>
-          <p:nvPr>
-            <p:ph type="title"/>
-          </p:nvPr>
-        </p:nvSpPr>
-        <p:spPr/>
-        <p:txBody>
-          <a:bodyPr/>
-          <a:lstStyle/>
-          <a:p>
-            <a:pPr lvl="0" marL="0" indent="0">
-              <a:buNone/>
-            </a:pPr>
-            <a:r>
-              <a:rPr/>
-              <a:t>Course</a:t>
-            </a:r>
-            <a:r>
-              <a:rPr/>
-              <a:t> </a:t>
-            </a:r>
-            <a:r>
-              <a:rPr/>
-              <a:t>instructor,</a:t>
-            </a:r>
-            <a:r>
-              <a:rPr/>
-              <a:t> </a:t>
-            </a:r>
-            <a:r>
-              <a:rPr/>
-              <a:t>Steve</a:t>
-            </a:r>
-            <a:r>
-              <a:rPr/>
-              <a:t> </a:t>
-            </a:r>
-            <a:r>
-              <a:rPr/>
-              <a:t>Simon</a:t>
-            </a:r>
-          </a:p>
-        </p:txBody>
-      </p:sp>
-      <p:pic>
-        <p:nvPicPr>
-          <p:cNvPr descr="../images/SteveSimonPic.jpg" id="0" name="Picture 1"/>
-          <p:cNvPicPr>
-            <a:picLocks noGrp="1" noChangeAspect="1"/>
-          </p:cNvPicPr>
-          <p:nvPr/>
-        </p:nvPicPr>
-        <p:blipFill>
-          <a:blip r:embed="rId3"/>
-          <a:stretch>
-            <a:fillRect/>
-          </a:stretch>
-        </p:blipFill>
-        <p:spPr bwMode="auto">
-          <a:xfrm>
-            <a:off x="2794000" y="1600200"/>
-            <a:ext cx="3543300" cy="4521200"/>
-          </a:xfrm>
-          <a:prstGeom prst="rect">
-            <a:avLst/>
-          </a:prstGeom>
-          <a:noFill/>
-          <a:ln w="9525">
-            <a:noFill/>
-            <a:headEnd/>
-            <a:tailEnd/>
-          </a:ln>
-        </p:spPr>
-      </p:pic>
-    </p:spTree>
-  </p:cSld>
-</p:sld>
-</file>
-
-<file path=ppt/slides/slide30.xml><?xml version="1.0" encoding="utf-8"?>
+<file path=ppt/slides/slide31.xml><?xml version="1.0" encoding="utf-8"?>
 <p:sld xmlns:a="http://schemas.openxmlformats.org/drawingml/2006/main" xmlns:r="http://schemas.openxmlformats.org/officeDocument/2006/relationships" xmlns:p="http://schemas.openxmlformats.org/presentationml/2006/main">
   <p:cSld>
     <p:spTree>
@@ -20346,6 +20427,107 @@
             </a:pPr>
             <a:r>
               <a:rPr/>
+              <a:t>Course</a:t>
+            </a:r>
+            <a:r>
+              <a:rPr/>
+              <a:t> </a:t>
+            </a:r>
+            <a:r>
+              <a:rPr/>
+              <a:t>instructor,</a:t>
+            </a:r>
+            <a:r>
+              <a:rPr/>
+              <a:t> </a:t>
+            </a:r>
+            <a:r>
+              <a:rPr/>
+              <a:t>Steve</a:t>
+            </a:r>
+            <a:r>
+              <a:rPr/>
+              <a:t> </a:t>
+            </a:r>
+            <a:r>
+              <a:rPr/>
+              <a:t>Simon</a:t>
+            </a:r>
+          </a:p>
+        </p:txBody>
+      </p:sp>
+      <p:pic>
+        <p:nvPicPr>
+          <p:cNvPr descr="../images/SteveSimonPic.jpg" id="0" name="Picture 1"/>
+          <p:cNvPicPr>
+            <a:picLocks noGrp="1" noChangeAspect="1"/>
+          </p:cNvPicPr>
+          <p:nvPr/>
+        </p:nvPicPr>
+        <p:blipFill>
+          <a:blip r:embed="rId3"/>
+          <a:stretch>
+            <a:fillRect/>
+          </a:stretch>
+        </p:blipFill>
+        <p:spPr bwMode="auto">
+          <a:xfrm>
+            <a:off x="2794000" y="1600200"/>
+            <a:ext cx="3543300" cy="4521200"/>
+          </a:xfrm>
+          <a:prstGeom prst="rect">
+            <a:avLst/>
+          </a:prstGeom>
+          <a:noFill/>
+          <a:ln w="9525">
+            <a:noFill/>
+            <a:headEnd/>
+            <a:tailEnd/>
+          </a:ln>
+        </p:spPr>
+      </p:pic>
+    </p:spTree>
+  </p:cSld>
+</p:sld>
+</file>
+
+<file path=ppt/slides/slide5.xml><?xml version="1.0" encoding="utf-8"?>
+<p:sld xmlns:a="http://schemas.openxmlformats.org/drawingml/2006/main" xmlns:r="http://schemas.openxmlformats.org/officeDocument/2006/relationships" xmlns:p="http://schemas.openxmlformats.org/presentationml/2006/main">
+  <p:cSld>
+    <p:spTree>
+      <p:nvGrpSpPr>
+        <p:cNvPr id="1" name=""/>
+        <p:cNvGrpSpPr/>
+        <p:nvPr/>
+      </p:nvGrpSpPr>
+      <p:grpSpPr>
+        <a:xfrm>
+          <a:off x="0" y="0"/>
+          <a:ext cx="0" cy="0"/>
+          <a:chOff x="0" y="0"/>
+          <a:chExt cx="0" cy="0"/>
+        </a:xfrm>
+      </p:grpSpPr>
+      <p:sp>
+        <p:nvSpPr>
+          <p:cNvPr id="2" name="Title 1"/>
+          <p:cNvSpPr>
+            <a:spLocks noGrp="1"/>
+          </p:cNvSpPr>
+          <p:nvPr>
+            <p:ph type="title"/>
+          </p:nvPr>
+        </p:nvSpPr>
+        <p:spPr/>
+        <p:txBody>
+          <a:bodyPr/>
+          <a:lstStyle/>
+          <a:p>
+            <a:pPr lvl="0" marL="0" indent="0">
+              <a:buNone/>
+            </a:pPr>
+            <a:r>
+              <a:rPr/>
               <a:t>Where</a:t>
             </a:r>
             <a:r>
@@ -20474,7 +20656,7 @@
 </p:sld>
 </file>
 
-<file path=ppt/slides/slide5.xml><?xml version="1.0" encoding="utf-8"?>
+<file path=ppt/slides/slide6.xml><?xml version="1.0" encoding="utf-8"?>
 <p:sld xmlns:a="http://schemas.openxmlformats.org/drawingml/2006/main" xmlns:r="http://schemas.openxmlformats.org/officeDocument/2006/relationships" xmlns:p="http://schemas.openxmlformats.org/presentationml/2006/main">
   <p:cSld>
     <p:spTree>
@@ -20669,7 +20851,7 @@
 </p:sld>
 </file>
 
-<file path=ppt/slides/slide6.xml><?xml version="1.0" encoding="utf-8"?>
+<file path=ppt/slides/slide7.xml><?xml version="1.0" encoding="utf-8"?>
 <p:sld xmlns:a="http://schemas.openxmlformats.org/drawingml/2006/main" xmlns:r="http://schemas.openxmlformats.org/officeDocument/2006/relationships" xmlns:p="http://schemas.openxmlformats.org/presentationml/2006/main">
   <p:cSld>
     <p:spTree>
@@ -20880,102 +21062,6 @@
 </p:sld>
 </file>
 
-<file path=ppt/slides/slide7.xml><?xml version="1.0" encoding="utf-8"?>
-<p:sld xmlns:a="http://schemas.openxmlformats.org/drawingml/2006/main" xmlns:r="http://schemas.openxmlformats.org/officeDocument/2006/relationships" xmlns:p="http://schemas.openxmlformats.org/presentationml/2006/main">
-  <p:cSld>
-    <p:spTree>
-      <p:nvGrpSpPr>
-        <p:cNvPr id="1" name=""/>
-        <p:cNvGrpSpPr/>
-        <p:nvPr/>
-      </p:nvGrpSpPr>
-      <p:grpSpPr>
-        <a:xfrm>
-          <a:off x="0" y="0"/>
-          <a:ext cx="0" cy="0"/>
-          <a:chOff x="0" y="0"/>
-          <a:chExt cx="0" cy="0"/>
-        </a:xfrm>
-      </p:grpSpPr>
-      <p:sp>
-        <p:nvSpPr>
-          <p:cNvPr id="2" name="Title 1"/>
-          <p:cNvSpPr>
-            <a:spLocks noGrp="1"/>
-          </p:cNvSpPr>
-          <p:nvPr>
-            <p:ph type="title"/>
-          </p:nvPr>
-        </p:nvSpPr>
-        <p:spPr/>
-        <p:txBody>
-          <a:bodyPr/>
-          <a:lstStyle/>
-          <a:p>
-            <a:pPr lvl="0" marL="0" indent="0">
-              <a:buNone/>
-            </a:pPr>
-            <a:r>
-              <a:rPr/>
-              <a:t>SAS</a:t>
-            </a:r>
-            <a:r>
-              <a:rPr/>
-              <a:t> </a:t>
-            </a:r>
-            <a:r>
-              <a:rPr/>
-              <a:t>using</a:t>
-            </a:r>
-            <a:r>
-              <a:rPr/>
-              <a:t> </a:t>
-            </a:r>
-            <a:r>
-              <a:rPr/>
-              <a:t>SAS</a:t>
-            </a:r>
-            <a:r>
-              <a:rPr/>
-              <a:t> </a:t>
-            </a:r>
-            <a:r>
-              <a:rPr/>
-              <a:t>University</a:t>
-            </a:r>
-          </a:p>
-        </p:txBody>
-      </p:sp>
-      <p:sp>
-        <p:nvSpPr>
-          <p:cNvPr id="3" name="Content Placeholder 2"/>
-          <p:cNvSpPr>
-            <a:spLocks noGrp="1"/>
-          </p:cNvSpPr>
-          <p:nvPr>
-            <p:ph idx="1"/>
-          </p:nvPr>
-        </p:nvSpPr>
-        <p:spPr/>
-        <p:txBody>
-          <a:bodyPr/>
-          <a:lstStyle/>
-          <a:p>
-            <a:pPr lvl="0" marL="0" indent="0">
-              <a:buNone/>
-            </a:pPr>
-            <a:r>
-              <a:rPr/>
-              <a:t>[Screenshot of main page for SAS University]</a:t>
-            </a:r>
-          </a:p>
-        </p:txBody>
-      </p:sp>
-    </p:spTree>
-  </p:cSld>
-</p:sld>
-</file>
-
 <file path=ppt/slides/slide8.xml><?xml version="1.0" encoding="utf-8"?>
 <p:sld xmlns:a="http://schemas.openxmlformats.org/drawingml/2006/main" xmlns:r="http://schemas.openxmlformats.org/officeDocument/2006/relationships" xmlns:p="http://schemas.openxmlformats.org/presentationml/2006/main">
   <p:cSld>
@@ -21029,15 +21115,15 @@
             </a:r>
             <a:r>
               <a:rPr/>
-              <a:t>Jupyter</a:t>
-            </a:r>
-            <a:r>
-              <a:rPr/>
-              <a:t> </a:t>
-            </a:r>
-            <a:r>
-              <a:rPr/>
-              <a:t>notebooks</a:t>
+              <a:t>SAS</a:t>
+            </a:r>
+            <a:r>
+              <a:rPr/>
+              <a:t> </a:t>
+            </a:r>
+            <a:r>
+              <a:rPr/>
+              <a:t>University</a:t>
             </a:r>
           </a:p>
         </p:txBody>
@@ -21062,7 +21148,7 @@
             </a:pPr>
             <a:r>
               <a:rPr/>
-              <a:t>[Screenshot of SAS blog entry on Jupyter]</a:t>
+              <a:t>[Screenshot of main page for SAS University]</a:t>
             </a:r>
           </a:p>
         </p:txBody>
@@ -21125,15 +21211,15 @@
             </a:r>
             <a:r>
               <a:rPr/>
-              <a:t>SAS</a:t>
-            </a:r>
-            <a:r>
-              <a:rPr/>
-              <a:t> </a:t>
-            </a:r>
-            <a:r>
-              <a:rPr/>
-              <a:t>markdown</a:t>
+              <a:t>Jupyter</a:t>
+            </a:r>
+            <a:r>
+              <a:rPr/>
+              <a:t> </a:t>
+            </a:r>
+            <a:r>
+              <a:rPr/>
+              <a:t>notebooks</a:t>
             </a:r>
           </a:p>
         </p:txBody>
@@ -21158,7 +21244,7 @@
             </a:pPr>
             <a:r>
               <a:rPr/>
-              <a:t>[Screenshot of SAS markdown web page]</a:t>
+              <a:t>[Screenshot of SAS blog entry on Jupyter]</a:t>
             </a:r>
           </a:p>
         </p:txBody>

</xml_diff>

<commit_message>
Fixed origin problem, maybe
</commit_message>
<xml_diff>
--- a/basics1/results/getting-started.pptx
+++ b/basics1/results/getting-started.pptx
@@ -5,7 +5,7 @@
     <p:sldMasterId id="2147483648" r:id="rId1"/>
   </p:sldMasterIdLst>
   <p:notesMasterIdLst>
-    <p:NotesMasterId r:id="rId33"/>
+    <p:NotesMasterId r:id="rId32"/>
   </p:notesMasterIdLst>
   <p:sldIdLst>
     <p:sldId id="256" r:id="rId2"/>
@@ -38,7 +38,6 @@
     <p:sldId id="283" r:id="rId29"/>
     <p:sldId id="284" r:id="rId30"/>
     <p:sldId id="285" r:id="rId31"/>
-    <p:sldId id="286" r:id="rId32"/>
   </p:sldIdLst>
   <p:sldSz cx="9144000" cy="6858000" type="screen4x3"/>
   <p:notesSz cx="6858000" cy="9144000"/>
@@ -555,6 +554,28 @@
             </a:pPr>
             <a:r>
               <a:rPr/>
+              <a:t>[[Speaker</a:t>
+            </a:r>
+            <a:r>
+              <a:rPr/>
+              <a:t> </a:t>
+            </a:r>
+            <a:r>
+              <a:rPr/>
+              <a:t>notes]]</a:t>
+            </a:r>
+          </a:p>
+          <a:p>
+            <a:pPr lvl="0" marL="0" indent="0">
+              <a:buNone/>
+            </a:pPr>
+          </a:p>
+          <a:p>
+            <a:pPr lvl="0" marL="0" indent="0">
+              <a:buNone/>
+            </a:pPr>
+            <a:r>
+              <a:rPr/>
               <a:t>Okay.</a:t>
             </a:r>
             <a:r>
@@ -1303,7 +1324,7 @@
           <a:p>
             <a:fld id="{18BDFEC3-8487-43E8-A154-7C12CBC1FFF2}" type="slidenum">
               <a:rPr lang="en-US"/>
-              <a:t>3</a:t>
+              <a:t>2</a:t>
             </a:fld>
             <a:endParaRPr lang="en-US"/>
           </a:p>
@@ -1363,6 +1384,28 @@
             </a:pPr>
             <a:r>
               <a:rPr/>
+              <a:t>[[Speaker</a:t>
+            </a:r>
+            <a:r>
+              <a:rPr/>
+              <a:t> </a:t>
+            </a:r>
+            <a:r>
+              <a:rPr/>
+              <a:t>notes]]</a:t>
+            </a:r>
+          </a:p>
+          <a:p>
+            <a:pPr lvl="0" marL="0" indent="0">
+              <a:buNone/>
+            </a:pPr>
+          </a:p>
+          <a:p>
+            <a:pPr lvl="0" marL="0" indent="0">
+              <a:buNone/>
+            </a:pPr>
+            <a:r>
+              <a:rPr/>
               <a:t>This</a:t>
             </a:r>
             <a:r>
@@ -1673,7 +1716,7 @@
           <a:p>
             <a:fld id="{18BDFEC3-8487-43E8-A154-7C12CBC1FFF2}" type="slidenum">
               <a:rPr lang="en-US"/>
-              <a:t>12</a:t>
+              <a:t>11</a:t>
             </a:fld>
             <a:endParaRPr lang="en-US"/>
           </a:p>
@@ -1733,6 +1776,28 @@
             </a:pPr>
             <a:r>
               <a:rPr/>
+              <a:t>[[Speaker</a:t>
+            </a:r>
+            <a:r>
+              <a:rPr/>
+              <a:t> </a:t>
+            </a:r>
+            <a:r>
+              <a:rPr/>
+              <a:t>notes]]</a:t>
+            </a:r>
+          </a:p>
+          <a:p>
+            <a:pPr lvl="0" marL="0" indent="0">
+              <a:buNone/>
+            </a:pPr>
+          </a:p>
+          <a:p>
+            <a:pPr lvl="0" marL="0" indent="0">
+              <a:buNone/>
+            </a:pPr>
+            <a:r>
+              <a:rPr/>
               <a:t>If</a:t>
             </a:r>
             <a:r>
@@ -2273,7 +2338,7 @@
           <a:p>
             <a:fld id="{18BDFEC3-8487-43E8-A154-7C12CBC1FFF2}" type="slidenum">
               <a:rPr lang="en-US"/>
-              <a:t>13</a:t>
+              <a:t>12</a:t>
             </a:fld>
             <a:endParaRPr lang="en-US"/>
           </a:p>
@@ -2333,6 +2398,28 @@
             </a:pPr>
             <a:r>
               <a:rPr/>
+              <a:t>[[Speaker</a:t>
+            </a:r>
+            <a:r>
+              <a:rPr/>
+              <a:t> </a:t>
+            </a:r>
+            <a:r>
+              <a:rPr/>
+              <a:t>notes]]</a:t>
+            </a:r>
+          </a:p>
+          <a:p>
+            <a:pPr lvl="0" marL="0" indent="0">
+              <a:buNone/>
+            </a:pPr>
+          </a:p>
+          <a:p>
+            <a:pPr lvl="0" marL="0" indent="0">
+              <a:buNone/>
+            </a:pPr>
+            <a:r>
+              <a:rPr/>
               <a:t>After</a:t>
             </a:r>
             <a:r>
@@ -2483,7 +2570,7 @@
           <a:p>
             <a:fld id="{18BDFEC3-8487-43E8-A154-7C12CBC1FFF2}" type="slidenum">
               <a:rPr lang="en-US"/>
-              <a:t>14</a:t>
+              <a:t>13</a:t>
             </a:fld>
             <a:endParaRPr lang="en-US"/>
           </a:p>
@@ -2543,6 +2630,28 @@
             </a:pPr>
             <a:r>
               <a:rPr/>
+              <a:t>[[Speaker</a:t>
+            </a:r>
+            <a:r>
+              <a:rPr/>
+              <a:t> </a:t>
+            </a:r>
+            <a:r>
+              <a:rPr/>
+              <a:t>notes]]</a:t>
+            </a:r>
+          </a:p>
+          <a:p>
+            <a:pPr lvl="0" marL="0" indent="0">
+              <a:buNone/>
+            </a:pPr>
+          </a:p>
+          <a:p>
+            <a:pPr lvl="0" marL="0" indent="0">
+              <a:buNone/>
+            </a:pPr>
+            <a:r>
+              <a:rPr/>
               <a:t>The</a:t>
             </a:r>
             <a:r>
@@ -2909,7 +3018,7 @@
           <a:p>
             <a:fld id="{18BDFEC3-8487-43E8-A154-7C12CBC1FFF2}" type="slidenum">
               <a:rPr lang="en-US"/>
-              <a:t>15</a:t>
+              <a:t>14</a:t>
             </a:fld>
             <a:endParaRPr lang="en-US"/>
           </a:p>
@@ -2969,6 +3078,28 @@
             </a:pPr>
             <a:r>
               <a:rPr/>
+              <a:t>[[Speaker</a:t>
+            </a:r>
+            <a:r>
+              <a:rPr/>
+              <a:t> </a:t>
+            </a:r>
+            <a:r>
+              <a:rPr/>
+              <a:t>notes]]</a:t>
+            </a:r>
+          </a:p>
+          <a:p>
+            <a:pPr lvl="0" marL="0" indent="0">
+              <a:buNone/>
+            </a:pPr>
+          </a:p>
+          <a:p>
+            <a:pPr lvl="0" marL="0" indent="0">
+              <a:buNone/>
+            </a:pPr>
+            <a:r>
+              <a:rPr/>
               <a:t>Always</a:t>
             </a:r>
             <a:r>
@@ -3223,7 +3354,7 @@
           <a:p>
             <a:fld id="{18BDFEC3-8487-43E8-A154-7C12CBC1FFF2}" type="slidenum">
               <a:rPr lang="en-US"/>
-              <a:t>16</a:t>
+              <a:t>15</a:t>
             </a:fld>
             <a:endParaRPr lang="en-US"/>
           </a:p>
@@ -3283,6 +3414,28 @@
             </a:pPr>
             <a:r>
               <a:rPr/>
+              <a:t>[[Speaker</a:t>
+            </a:r>
+            <a:r>
+              <a:rPr/>
+              <a:t> </a:t>
+            </a:r>
+            <a:r>
+              <a:rPr/>
+              <a:t>notes]]</a:t>
+            </a:r>
+          </a:p>
+          <a:p>
+            <a:pPr lvl="0" marL="0" indent="0">
+              <a:buNone/>
+            </a:pPr>
+          </a:p>
+          <a:p>
+            <a:pPr lvl="0" marL="0" indent="0">
+              <a:buNone/>
+            </a:pPr>
+            <a:r>
+              <a:rPr/>
               <a:t>Always</a:t>
             </a:r>
             <a:r>
@@ -3425,7 +3578,7 @@
           <a:p>
             <a:fld id="{18BDFEC3-8487-43E8-A154-7C12CBC1FFF2}" type="slidenum">
               <a:rPr lang="en-US"/>
-              <a:t>17</a:t>
+              <a:t>16</a:t>
             </a:fld>
             <a:endParaRPr lang="en-US"/>
           </a:p>
@@ -3485,6 +3638,28 @@
             </a:pPr>
             <a:r>
               <a:rPr/>
+              <a:t>[[Speaker</a:t>
+            </a:r>
+            <a:r>
+              <a:rPr/>
+              <a:t> </a:t>
+            </a:r>
+            <a:r>
+              <a:rPr/>
+              <a:t>notes]]</a:t>
+            </a:r>
+          </a:p>
+          <a:p>
+            <a:pPr lvl="0" marL="0" indent="0">
+              <a:buNone/>
+            </a:pPr>
+          </a:p>
+          <a:p>
+            <a:pPr lvl="0" marL="0" indent="0">
+              <a:buNone/>
+            </a:pPr>
+            <a:r>
+              <a:rPr/>
               <a:t>..and</a:t>
             </a:r>
             <a:r>
@@ -3579,7 +3754,7 @@
           <a:p>
             <a:fld id="{18BDFEC3-8487-43E8-A154-7C12CBC1FFF2}" type="slidenum">
               <a:rPr lang="en-US"/>
-              <a:t>18</a:t>
+              <a:t>17</a:t>
             </a:fld>
             <a:endParaRPr lang="en-US"/>
           </a:p>
@@ -3639,6 +3814,28 @@
             </a:pPr>
             <a:r>
               <a:rPr/>
+              <a:t>[[Speaker</a:t>
+            </a:r>
+            <a:r>
+              <a:rPr/>
+              <a:t> </a:t>
+            </a:r>
+            <a:r>
+              <a:rPr/>
+              <a:t>notes]]</a:t>
+            </a:r>
+          </a:p>
+          <a:p>
+            <a:pPr lvl="0" marL="0" indent="0">
+              <a:buNone/>
+            </a:pPr>
+          </a:p>
+          <a:p>
+            <a:pPr lvl="0" marL="0" indent="0">
+              <a:buNone/>
+            </a:pPr>
+            <a:r>
+              <a:rPr/>
               <a:t>Output</a:t>
             </a:r>
             <a:r>
@@ -4277,7 +4474,7 @@
           <a:p>
             <a:fld id="{18BDFEC3-8487-43E8-A154-7C12CBC1FFF2}" type="slidenum">
               <a:rPr lang="en-US"/>
-              <a:t>19</a:t>
+              <a:t>18</a:t>
             </a:fld>
             <a:endParaRPr lang="en-US"/>
           </a:p>
@@ -4337,6 +4534,28 @@
             </a:pPr>
             <a:r>
               <a:rPr/>
+              <a:t>[[Speaker</a:t>
+            </a:r>
+            <a:r>
+              <a:rPr/>
+              <a:t> </a:t>
+            </a:r>
+            <a:r>
+              <a:rPr/>
+              <a:t>notes]]</a:t>
+            </a:r>
+          </a:p>
+          <a:p>
+            <a:pPr lvl="0" marL="0" indent="0">
+              <a:buNone/>
+            </a:pPr>
+          </a:p>
+          <a:p>
+            <a:pPr lvl="0" marL="0" indent="0">
+              <a:buNone/>
+            </a:pPr>
+            <a:r>
+              <a:rPr/>
               <a:t>There</a:t>
             </a:r>
             <a:r>
@@ -4887,7 +5106,7 @@
           <a:p>
             <a:fld id="{18BDFEC3-8487-43E8-A154-7C12CBC1FFF2}" type="slidenum">
               <a:rPr lang="en-US"/>
-              <a:t>20</a:t>
+              <a:t>19</a:t>
             </a:fld>
             <a:endParaRPr lang="en-US"/>
           </a:p>
@@ -4947,6 +5166,28 @@
             </a:pPr>
             <a:r>
               <a:rPr/>
+              <a:t>[[Speaker</a:t>
+            </a:r>
+            <a:r>
+              <a:rPr/>
+              <a:t> </a:t>
+            </a:r>
+            <a:r>
+              <a:rPr/>
+              <a:t>notes]]</a:t>
+            </a:r>
+          </a:p>
+          <a:p>
+            <a:pPr lvl="0" marL="0" indent="0">
+              <a:buNone/>
+            </a:pPr>
+          </a:p>
+          <a:p>
+            <a:pPr lvl="0" marL="0" indent="0">
+              <a:buNone/>
+            </a:pPr>
+            <a:r>
+              <a:rPr/>
               <a:t>Here’s</a:t>
             </a:r>
             <a:r>
@@ -5081,7 +5322,7 @@
           <a:p>
             <a:fld id="{18BDFEC3-8487-43E8-A154-7C12CBC1FFF2}" type="slidenum">
               <a:rPr lang="en-US"/>
-              <a:t>21</a:t>
+              <a:t>20</a:t>
             </a:fld>
             <a:endParaRPr lang="en-US"/>
           </a:p>
@@ -5141,6 +5382,28 @@
             </a:pPr>
             <a:r>
               <a:rPr/>
+              <a:t>[[Speaker</a:t>
+            </a:r>
+            <a:r>
+              <a:rPr/>
+              <a:t> </a:t>
+            </a:r>
+            <a:r>
+              <a:rPr/>
+              <a:t>notes]]</a:t>
+            </a:r>
+          </a:p>
+          <a:p>
+            <a:pPr lvl="0" marL="0" indent="0">
+              <a:buNone/>
+            </a:pPr>
+          </a:p>
+          <a:p>
+            <a:pPr lvl="0" marL="0" indent="0">
+              <a:buNone/>
+            </a:pPr>
+            <a:r>
+              <a:rPr/>
               <a:t>Stop</a:t>
             </a:r>
             <a:r>
@@ -5315,7 +5578,7 @@
           <a:p>
             <a:fld id="{18BDFEC3-8487-43E8-A154-7C12CBC1FFF2}" type="slidenum">
               <a:rPr lang="en-US"/>
-              <a:t>4</a:t>
+              <a:t>3</a:t>
             </a:fld>
             <a:endParaRPr lang="en-US"/>
           </a:p>
@@ -5375,6 +5638,28 @@
             </a:pPr>
             <a:r>
               <a:rPr/>
+              <a:t>[[Speaker</a:t>
+            </a:r>
+            <a:r>
+              <a:rPr/>
+              <a:t> </a:t>
+            </a:r>
+            <a:r>
+              <a:rPr/>
+              <a:t>notes]]</a:t>
+            </a:r>
+          </a:p>
+          <a:p>
+            <a:pPr lvl="0" marL="0" indent="0">
+              <a:buNone/>
+            </a:pPr>
+          </a:p>
+          <a:p>
+            <a:pPr lvl="0" marL="0" indent="0">
+              <a:buNone/>
+            </a:pPr>
+            <a:r>
+              <a:rPr/>
               <a:t>Here’s</a:t>
             </a:r>
             <a:r>
@@ -5573,7 +5858,7 @@
           <a:p>
             <a:fld id="{18BDFEC3-8487-43E8-A154-7C12CBC1FFF2}" type="slidenum">
               <a:rPr lang="en-US"/>
-              <a:t>22</a:t>
+              <a:t>21</a:t>
             </a:fld>
             <a:endParaRPr lang="en-US"/>
           </a:p>
@@ -5633,6 +5918,28 @@
             </a:pPr>
             <a:r>
               <a:rPr/>
+              <a:t>[[Speaker</a:t>
+            </a:r>
+            <a:r>
+              <a:rPr/>
+              <a:t> </a:t>
+            </a:r>
+            <a:r>
+              <a:rPr/>
+              <a:t>notes]]</a:t>
+            </a:r>
+          </a:p>
+          <a:p>
+            <a:pPr lvl="0" marL="0" indent="0">
+              <a:buNone/>
+            </a:pPr>
+          </a:p>
+          <a:p>
+            <a:pPr lvl="0" marL="0" indent="0">
+              <a:buNone/>
+            </a:pPr>
+            <a:r>
+              <a:rPr/>
               <a:t>If</a:t>
             </a:r>
             <a:r>
@@ -5947,7 +6254,7 @@
           <a:p>
             <a:fld id="{18BDFEC3-8487-43E8-A154-7C12CBC1FFF2}" type="slidenum">
               <a:rPr lang="en-US"/>
-              <a:t>23</a:t>
+              <a:t>22</a:t>
             </a:fld>
             <a:endParaRPr lang="en-US"/>
           </a:p>
@@ -6007,6 +6314,28 @@
             </a:pPr>
             <a:r>
               <a:rPr/>
+              <a:t>[[Speaker</a:t>
+            </a:r>
+            <a:r>
+              <a:rPr/>
+              <a:t> </a:t>
+            </a:r>
+            <a:r>
+              <a:rPr/>
+              <a:t>notes]]</a:t>
+            </a:r>
+          </a:p>
+          <a:p>
+            <a:pPr lvl="0" marL="0" indent="0">
+              <a:buNone/>
+            </a:pPr>
+          </a:p>
+          <a:p>
+            <a:pPr lvl="0" marL="0" indent="0">
+              <a:buNone/>
+            </a:pPr>
+            <a:r>
+              <a:rPr/>
               <a:t>Click</a:t>
             </a:r>
             <a:r>
@@ -6309,7 +6638,7 @@
           <a:p>
             <a:fld id="{18BDFEC3-8487-43E8-A154-7C12CBC1FFF2}" type="slidenum">
               <a:rPr lang="en-US"/>
-              <a:t>24</a:t>
+              <a:t>23</a:t>
             </a:fld>
             <a:endParaRPr lang="en-US"/>
           </a:p>
@@ -6369,6 +6698,28 @@
             </a:pPr>
             <a:r>
               <a:rPr/>
+              <a:t>[[Speaker</a:t>
+            </a:r>
+            <a:r>
+              <a:rPr/>
+              <a:t> </a:t>
+            </a:r>
+            <a:r>
+              <a:rPr/>
+              <a:t>notes]]</a:t>
+            </a:r>
+          </a:p>
+          <a:p>
+            <a:pPr lvl="0" marL="0" indent="0">
+              <a:buNone/>
+            </a:pPr>
+          </a:p>
+          <a:p>
+            <a:pPr lvl="0" marL="0" indent="0">
+              <a:buNone/>
+            </a:pPr>
+            <a:r>
+              <a:rPr/>
               <a:t>When</a:t>
             </a:r>
             <a:r>
@@ -6707,7 +7058,7 @@
           <a:p>
             <a:fld id="{18BDFEC3-8487-43E8-A154-7C12CBC1FFF2}" type="slidenum">
               <a:rPr lang="en-US"/>
-              <a:t>25</a:t>
+              <a:t>24</a:t>
             </a:fld>
             <a:endParaRPr lang="en-US"/>
           </a:p>
@@ -6767,6 +7118,28 @@
             </a:pPr>
             <a:r>
               <a:rPr/>
+              <a:t>[[Speaker</a:t>
+            </a:r>
+            <a:r>
+              <a:rPr/>
+              <a:t> </a:t>
+            </a:r>
+            <a:r>
+              <a:rPr/>
+              <a:t>notes]]</a:t>
+            </a:r>
+          </a:p>
+          <a:p>
+            <a:pPr lvl="0" marL="0" indent="0">
+              <a:buNone/>
+            </a:pPr>
+          </a:p>
+          <a:p>
+            <a:pPr lvl="0" marL="0" indent="0">
+              <a:buNone/>
+            </a:pPr>
+            <a:r>
+              <a:rPr/>
               <a:t>When</a:t>
             </a:r>
             <a:r>
@@ -7105,7 +7478,7 @@
           <a:p>
             <a:fld id="{18BDFEC3-8487-43E8-A154-7C12CBC1FFF2}" type="slidenum">
               <a:rPr lang="en-US"/>
-              <a:t>26</a:t>
+              <a:t>25</a:t>
             </a:fld>
             <a:endParaRPr lang="en-US"/>
           </a:p>
@@ -7165,6 +7538,28 @@
             </a:pPr>
             <a:r>
               <a:rPr/>
+              <a:t>[[Speaker</a:t>
+            </a:r>
+            <a:r>
+              <a:rPr/>
+              <a:t> </a:t>
+            </a:r>
+            <a:r>
+              <a:rPr/>
+              <a:t>notes]]</a:t>
+            </a:r>
+          </a:p>
+          <a:p>
+            <a:pPr lvl="0" marL="0" indent="0">
+              <a:buNone/>
+            </a:pPr>
+          </a:p>
+          <a:p>
+            <a:pPr lvl="0" marL="0" indent="0">
+              <a:buNone/>
+            </a:pPr>
+            <a:r>
+              <a:rPr/>
               <a:t>You</a:t>
             </a:r>
             <a:r>
@@ -7371,7 +7766,7 @@
           <a:p>
             <a:fld id="{18BDFEC3-8487-43E8-A154-7C12CBC1FFF2}" type="slidenum">
               <a:rPr lang="en-US"/>
-              <a:t>27</a:t>
+              <a:t>26</a:t>
             </a:fld>
             <a:endParaRPr lang="en-US"/>
           </a:p>
@@ -7431,6 +7826,28 @@
             </a:pPr>
             <a:r>
               <a:rPr/>
+              <a:t>[[Speaker</a:t>
+            </a:r>
+            <a:r>
+              <a:rPr/>
+              <a:t> </a:t>
+            </a:r>
+            <a:r>
+              <a:rPr/>
+              <a:t>notes]]</a:t>
+            </a:r>
+          </a:p>
+          <a:p>
+            <a:pPr lvl="0" marL="0" indent="0">
+              <a:buNone/>
+            </a:pPr>
+          </a:p>
+          <a:p>
+            <a:pPr lvl="0" marL="0" indent="0">
+              <a:buNone/>
+            </a:pPr>
+            <a:r>
+              <a:rPr/>
               <a:t>Here</a:t>
             </a:r>
             <a:r>
@@ -7811,7 +8228,7 @@
           <a:p>
             <a:fld id="{18BDFEC3-8487-43E8-A154-7C12CBC1FFF2}" type="slidenum">
               <a:rPr lang="en-US"/>
-              <a:t>30</a:t>
+              <a:t>29</a:t>
             </a:fld>
             <a:endParaRPr lang="en-US"/>
           </a:p>
@@ -7871,6 +8288,28 @@
             </a:pPr>
             <a:r>
               <a:rPr/>
+              <a:t>[[Speaker</a:t>
+            </a:r>
+            <a:r>
+              <a:rPr/>
+              <a:t> </a:t>
+            </a:r>
+            <a:r>
+              <a:rPr/>
+              <a:t>notes]]</a:t>
+            </a:r>
+          </a:p>
+          <a:p>
+            <a:pPr lvl="0" marL="0" indent="0">
+              <a:buNone/>
+            </a:pPr>
+          </a:p>
+          <a:p>
+            <a:pPr lvl="0" marL="0" indent="0">
+              <a:buNone/>
+            </a:pPr>
+            <a:r>
+              <a:rPr/>
               <a:t>You</a:t>
             </a:r>
             <a:r>
@@ -8387,7 +8826,7 @@
           <a:p>
             <a:fld id="{18BDFEC3-8487-43E8-A154-7C12CBC1FFF2}" type="slidenum">
               <a:rPr lang="en-US"/>
-              <a:t>31</a:t>
+              <a:t>30</a:t>
             </a:fld>
             <a:endParaRPr lang="en-US"/>
           </a:p>
@@ -8447,6 +8886,28 @@
             </a:pPr>
             <a:r>
               <a:rPr/>
+              <a:t>[[Speaker</a:t>
+            </a:r>
+            <a:r>
+              <a:rPr/>
+              <a:t> </a:t>
+            </a:r>
+            <a:r>
+              <a:rPr/>
+              <a:t>notes]]</a:t>
+            </a:r>
+          </a:p>
+          <a:p>
+            <a:pPr lvl="0" marL="0" indent="0">
+              <a:buNone/>
+            </a:pPr>
+          </a:p>
+          <a:p>
+            <a:pPr lvl="0" marL="0" indent="0">
+              <a:buNone/>
+            </a:pPr>
+            <a:r>
+              <a:rPr/>
               <a:t>There</a:t>
             </a:r>
             <a:r>
@@ -8779,7 +9240,7 @@
           <a:p>
             <a:fld id="{18BDFEC3-8487-43E8-A154-7C12CBC1FFF2}" type="slidenum">
               <a:rPr lang="en-US"/>
-              <a:t>5</a:t>
+              <a:t>4</a:t>
             </a:fld>
             <a:endParaRPr lang="en-US"/>
           </a:p>
@@ -8839,6 +9300,28 @@
             </a:pPr>
             <a:r>
               <a:rPr/>
+              <a:t>[[Speaker</a:t>
+            </a:r>
+            <a:r>
+              <a:rPr/>
+              <a:t> </a:t>
+            </a:r>
+            <a:r>
+              <a:rPr/>
+              <a:t>notes]]</a:t>
+            </a:r>
+          </a:p>
+          <a:p>
+            <a:pPr lvl="0" marL="0" indent="0">
+              <a:buNone/>
+            </a:pPr>
+          </a:p>
+          <a:p>
+            <a:pPr lvl="0" marL="0" indent="0">
+              <a:buNone/>
+            </a:pPr>
+            <a:r>
+              <a:rPr/>
               <a:t>This</a:t>
             </a:r>
             <a:r>
@@ -10017,7 +10500,7 @@
           <a:p>
             <a:fld id="{18BDFEC3-8487-43E8-A154-7C12CBC1FFF2}" type="slidenum">
               <a:rPr lang="en-US"/>
-              <a:t>6</a:t>
+              <a:t>5</a:t>
             </a:fld>
             <a:endParaRPr lang="en-US"/>
           </a:p>
@@ -10077,6 +10560,28 @@
             </a:pPr>
             <a:r>
               <a:rPr/>
+              <a:t>[[Speaker</a:t>
+            </a:r>
+            <a:r>
+              <a:rPr/>
+              <a:t> </a:t>
+            </a:r>
+            <a:r>
+              <a:rPr/>
+              <a:t>notes]]</a:t>
+            </a:r>
+          </a:p>
+          <a:p>
+            <a:pPr lvl="0" marL="0" indent="0">
+              <a:buNone/>
+            </a:pPr>
+          </a:p>
+          <a:p>
+            <a:pPr lvl="0" marL="0" indent="0">
+              <a:buNone/>
+            </a:pPr>
+            <a:r>
+              <a:rPr/>
               <a:t>Again,</a:t>
             </a:r>
             <a:r>
@@ -10741,7 +11246,7 @@
           <a:p>
             <a:fld id="{18BDFEC3-8487-43E8-A154-7C12CBC1FFF2}" type="slidenum">
               <a:rPr lang="en-US"/>
-              <a:t>7</a:t>
+              <a:t>6</a:t>
             </a:fld>
             <a:endParaRPr lang="en-US"/>
           </a:p>
@@ -10801,6 +11306,28 @@
             </a:pPr>
             <a:r>
               <a:rPr/>
+              <a:t>[[Speaker</a:t>
+            </a:r>
+            <a:r>
+              <a:rPr/>
+              <a:t> </a:t>
+            </a:r>
+            <a:r>
+              <a:rPr/>
+              <a:t>notes]]</a:t>
+            </a:r>
+          </a:p>
+          <a:p>
+            <a:pPr lvl="0" marL="0" indent="0">
+              <a:buNone/>
+            </a:pPr>
+          </a:p>
+          <a:p>
+            <a:pPr lvl="0" marL="0" indent="0">
+              <a:buNone/>
+            </a:pPr>
+            <a:r>
+              <a:rPr/>
               <a:t>I</a:t>
             </a:r>
             <a:r>
@@ -12043,7 +12570,7 @@
           <a:p>
             <a:fld id="{18BDFEC3-8487-43E8-A154-7C12CBC1FFF2}" type="slidenum">
               <a:rPr lang="en-US"/>
-              <a:t>8</a:t>
+              <a:t>7</a:t>
             </a:fld>
             <a:endParaRPr lang="en-US"/>
           </a:p>
@@ -12103,6 +12630,28 @@
             </a:pPr>
             <a:r>
               <a:rPr/>
+              <a:t>[[Speaker</a:t>
+            </a:r>
+            <a:r>
+              <a:rPr/>
+              <a:t> </a:t>
+            </a:r>
+            <a:r>
+              <a:rPr/>
+              <a:t>notes]]</a:t>
+            </a:r>
+          </a:p>
+          <a:p>
+            <a:pPr lvl="0" marL="0" indent="0">
+              <a:buNone/>
+            </a:pPr>
+          </a:p>
+          <a:p>
+            <a:pPr lvl="0" marL="0" indent="0">
+              <a:buNone/>
+            </a:pPr>
+            <a:r>
+              <a:rPr/>
               <a:t>Again,</a:t>
             </a:r>
             <a:r>
@@ -12891,7 +13440,7 @@
           <a:p>
             <a:fld id="{18BDFEC3-8487-43E8-A154-7C12CBC1FFF2}" type="slidenum">
               <a:rPr lang="en-US"/>
-              <a:t>9</a:t>
+              <a:t>8</a:t>
             </a:fld>
             <a:endParaRPr lang="en-US"/>
           </a:p>
@@ -12951,6 +13500,28 @@
             </a:pPr>
             <a:r>
               <a:rPr/>
+              <a:t>[[Speaker</a:t>
+            </a:r>
+            <a:r>
+              <a:rPr/>
+              <a:t> </a:t>
+            </a:r>
+            <a:r>
+              <a:rPr/>
+              <a:t>notes]]</a:t>
+            </a:r>
+          </a:p>
+          <a:p>
+            <a:pPr lvl="0" marL="0" indent="0">
+              <a:buNone/>
+            </a:pPr>
+          </a:p>
+          <a:p>
+            <a:pPr lvl="0" marL="0" indent="0">
+              <a:buNone/>
+            </a:pPr>
+            <a:r>
+              <a:rPr/>
               <a:t>Also</a:t>
             </a:r>
             <a:r>
@@ -13149,7 +13720,7 @@
           <a:p>
             <a:fld id="{18BDFEC3-8487-43E8-A154-7C12CBC1FFF2}" type="slidenum">
               <a:rPr lang="en-US"/>
-              <a:t>10</a:t>
+              <a:t>9</a:t>
             </a:fld>
             <a:endParaRPr lang="en-US"/>
           </a:p>
@@ -13209,6 +13780,28 @@
             </a:pPr>
             <a:r>
               <a:rPr/>
+              <a:t>[[Speaker</a:t>
+            </a:r>
+            <a:r>
+              <a:rPr/>
+              <a:t> </a:t>
+            </a:r>
+            <a:r>
+              <a:rPr/>
+              <a:t>notes]]</a:t>
+            </a:r>
+          </a:p>
+          <a:p>
+            <a:pPr lvl="0" marL="0" indent="0">
+              <a:buNone/>
+            </a:pPr>
+          </a:p>
+          <a:p>
+            <a:pPr lvl="0" marL="0" indent="0">
+              <a:buNone/>
+            </a:pPr>
+            <a:r>
+              <a:rPr/>
               <a:t>If</a:t>
             </a:r>
             <a:r>
@@ -13807,7 +14400,7 @@
           <a:p>
             <a:fld id="{18BDFEC3-8487-43E8-A154-7C12CBC1FFF2}" type="slidenum">
               <a:rPr lang="en-US"/>
-              <a:t>11</a:t>
+              <a:t>10</a:t>
             </a:fld>
             <a:endParaRPr lang="en-US"/>
           </a:p>
@@ -16926,102 +17519,6 @@
             </a:pPr>
             <a:r>
               <a:rPr/>
-              <a:t>SAS</a:t>
-            </a:r>
-            <a:r>
-              <a:rPr/>
-              <a:t> </a:t>
-            </a:r>
-            <a:r>
-              <a:rPr/>
-              <a:t>using</a:t>
-            </a:r>
-            <a:r>
-              <a:rPr/>
-              <a:t> </a:t>
-            </a:r>
-            <a:r>
-              <a:rPr/>
-              <a:t>SAS</a:t>
-            </a:r>
-            <a:r>
-              <a:rPr/>
-              <a:t> </a:t>
-            </a:r>
-            <a:r>
-              <a:rPr/>
-              <a:t>markdown</a:t>
-            </a:r>
-          </a:p>
-        </p:txBody>
-      </p:sp>
-      <p:sp>
-        <p:nvSpPr>
-          <p:cNvPr id="3" name="Content Placeholder 2"/>
-          <p:cNvSpPr>
-            <a:spLocks noGrp="1"/>
-          </p:cNvSpPr>
-          <p:nvPr>
-            <p:ph idx="1"/>
-          </p:nvPr>
-        </p:nvSpPr>
-        <p:spPr/>
-        <p:txBody>
-          <a:bodyPr/>
-          <a:lstStyle/>
-          <a:p>
-            <a:pPr lvl="0" marL="0" indent="0">
-              <a:buNone/>
-            </a:pPr>
-            <a:r>
-              <a:rPr/>
-              <a:t>[Screenshot of SAS markdown web page]</a:t>
-            </a:r>
-          </a:p>
-        </p:txBody>
-      </p:sp>
-    </p:spTree>
-  </p:cSld>
-</p:sld>
-</file>
-
-<file path=ppt/slides/slide11.xml><?xml version="1.0" encoding="utf-8"?>
-<p:sld xmlns:a="http://schemas.openxmlformats.org/drawingml/2006/main" xmlns:r="http://schemas.openxmlformats.org/officeDocument/2006/relationships" xmlns:p="http://schemas.openxmlformats.org/presentationml/2006/main">
-  <p:cSld>
-    <p:spTree>
-      <p:nvGrpSpPr>
-        <p:cNvPr id="1" name=""/>
-        <p:cNvGrpSpPr/>
-        <p:nvPr/>
-      </p:nvGrpSpPr>
-      <p:grpSpPr>
-        <a:xfrm>
-          <a:off x="0" y="0"/>
-          <a:ext cx="0" cy="0"/>
-          <a:chOff x="0" y="0"/>
-          <a:chExt cx="0" cy="0"/>
-        </a:xfrm>
-      </p:grpSpPr>
-      <p:sp>
-        <p:nvSpPr>
-          <p:cNvPr id="2" name="Title 1"/>
-          <p:cNvSpPr>
-            <a:spLocks noGrp="1"/>
-          </p:cNvSpPr>
-          <p:nvPr>
-            <p:ph type="title"/>
-          </p:nvPr>
-        </p:nvSpPr>
-        <p:spPr/>
-        <p:txBody>
-          <a:bodyPr/>
-          <a:lstStyle/>
-          <a:p>
-            <a:pPr lvl="0" marL="0" indent="0">
-              <a:buNone/>
-            </a:pPr>
-            <a:r>
-              <a:rPr/>
               <a:t>Opening</a:t>
             </a:r>
             <a:r>
@@ -17180,7 +17677,7 @@
 </p:sld>
 </file>
 
-<file path=ppt/slides/slide12.xml><?xml version="1.0" encoding="utf-8"?>
+<file path=ppt/slides/slide11.xml><?xml version="1.0" encoding="utf-8"?>
 <p:sld xmlns:a="http://schemas.openxmlformats.org/drawingml/2006/main" xmlns:r="http://schemas.openxmlformats.org/officeDocument/2006/relationships" xmlns:p="http://schemas.openxmlformats.org/presentationml/2006/main">
   <p:cSld>
     <p:spTree>
@@ -17383,7 +17880,7 @@
 </p:sld>
 </file>
 
-<file path=ppt/slides/slide13.xml><?xml version="1.0" encoding="utf-8"?>
+<file path=ppt/slides/slide12.xml><?xml version="1.0" encoding="utf-8"?>
 <p:sld xmlns:a="http://schemas.openxmlformats.org/drawingml/2006/main" xmlns:r="http://schemas.openxmlformats.org/officeDocument/2006/relationships" xmlns:p="http://schemas.openxmlformats.org/presentationml/2006/main">
   <p:cSld>
     <p:spTree>
@@ -17578,7 +18075,7 @@
 </p:sld>
 </file>
 
-<file path=ppt/slides/slide14.xml><?xml version="1.0" encoding="utf-8"?>
+<file path=ppt/slides/slide13.xml><?xml version="1.0" encoding="utf-8"?>
 <p:sld xmlns:a="http://schemas.openxmlformats.org/drawingml/2006/main" xmlns:r="http://schemas.openxmlformats.org/officeDocument/2006/relationships" xmlns:p="http://schemas.openxmlformats.org/presentationml/2006/main">
   <p:cSld>
     <p:spTree>
@@ -17678,7 +18175,7 @@
 </p:sld>
 </file>
 
-<file path=ppt/slides/slide15.xml><?xml version="1.0" encoding="utf-8"?>
+<file path=ppt/slides/slide14.xml><?xml version="1.0" encoding="utf-8"?>
 <p:sld xmlns:a="http://schemas.openxmlformats.org/drawingml/2006/main" xmlns:r="http://schemas.openxmlformats.org/officeDocument/2006/relationships" xmlns:p="http://schemas.openxmlformats.org/presentationml/2006/main">
   <p:cSld>
     <p:spTree>
@@ -17865,7 +18362,7 @@
 </p:sld>
 </file>
 
-<file path=ppt/slides/slide16.xml><?xml version="1.0" encoding="utf-8"?>
+<file path=ppt/slides/slide15.xml><?xml version="1.0" encoding="utf-8"?>
 <p:sld xmlns:a="http://schemas.openxmlformats.org/drawingml/2006/main" xmlns:r="http://schemas.openxmlformats.org/officeDocument/2006/relationships" xmlns:p="http://schemas.openxmlformats.org/presentationml/2006/main">
   <p:cSld>
     <p:spTree>
@@ -18068,6 +18565,118 @@
 </p:sld>
 </file>
 
+<file path=ppt/slides/slide16.xml><?xml version="1.0" encoding="utf-8"?>
+<p:sld xmlns:a="http://schemas.openxmlformats.org/drawingml/2006/main" xmlns:r="http://schemas.openxmlformats.org/officeDocument/2006/relationships" xmlns:p="http://schemas.openxmlformats.org/presentationml/2006/main">
+  <p:cSld>
+    <p:spTree>
+      <p:nvGrpSpPr>
+        <p:cNvPr id="1" name=""/>
+        <p:cNvGrpSpPr/>
+        <p:nvPr/>
+      </p:nvGrpSpPr>
+      <p:grpSpPr>
+        <a:xfrm>
+          <a:off x="0" y="0"/>
+          <a:ext cx="0" cy="0"/>
+          <a:chOff x="0" y="0"/>
+          <a:chExt cx="0" cy="0"/>
+        </a:xfrm>
+      </p:grpSpPr>
+      <p:sp>
+        <p:nvSpPr>
+          <p:cNvPr id="2" name="Title 1"/>
+          <p:cNvSpPr>
+            <a:spLocks noGrp="1"/>
+          </p:cNvSpPr>
+          <p:nvPr>
+            <p:ph type="title"/>
+          </p:nvPr>
+        </p:nvSpPr>
+        <p:spPr/>
+        <p:txBody>
+          <a:bodyPr/>
+          <a:lstStyle/>
+          <a:p>
+            <a:pPr lvl="0" marL="0" indent="0">
+              <a:buNone/>
+            </a:pPr>
+            <a:r>
+              <a:rPr/>
+              <a:t>Log</a:t>
+            </a:r>
+            <a:r>
+              <a:rPr/>
+              <a:t> </a:t>
+            </a:r>
+            <a:r>
+              <a:rPr/>
+              <a:t>messages</a:t>
+            </a:r>
+            <a:r>
+              <a:rPr/>
+              <a:t> </a:t>
+            </a:r>
+            <a:r>
+              <a:rPr/>
+              <a:t>(1</a:t>
+            </a:r>
+            <a:r>
+              <a:rPr/>
+              <a:t> </a:t>
+            </a:r>
+            <a:r>
+              <a:rPr/>
+              <a:t>of</a:t>
+            </a:r>
+            <a:r>
+              <a:rPr/>
+              <a:t> </a:t>
+            </a:r>
+            <a:r>
+              <a:rPr/>
+              <a:t>2)</a:t>
+            </a:r>
+          </a:p>
+        </p:txBody>
+      </p:sp>
+      <p:sp>
+        <p:nvSpPr>
+          <p:cNvPr id="3" name="Content Placeholder 2"/>
+          <p:cNvSpPr>
+            <a:spLocks noGrp="1"/>
+          </p:cNvSpPr>
+          <p:nvPr>
+            <p:ph idx="1"/>
+          </p:nvPr>
+        </p:nvSpPr>
+        <p:spPr/>
+        <p:txBody>
+          <a:bodyPr/>
+          <a:lstStyle/>
+          <a:p>
+            <a:pPr lvl="0" marL="1270000" indent="0">
+              <a:buNone/>
+            </a:pPr>
+            <a:r>
+              <a:rPr sz="1800">
+                <a:latin typeface="Courier"/>
+              </a:rPr>
+              <a:t>1    data test_example;
+2     input x y;
+3     cards;
+NOTE: The data set WORK.TEST_EXAMPLE has 3 observations and 2 variables.
+NOTE: DATA statement used (Total process time):
+      real time           0.51 seconds
+      cpu time            0.04 seconds</a:t>
+            </a:r>
+          </a:p>
+        </p:txBody>
+      </p:sp>
+    </p:spTree>
+  </p:cSld>
+</p:sld>
+</file>
+
 <file path=ppt/slides/slide17.xml><?xml version="1.0" encoding="utf-8"?>
 <p:sld xmlns:a="http://schemas.openxmlformats.org/drawingml/2006/main" xmlns:r="http://schemas.openxmlformats.org/officeDocument/2006/relationships" xmlns:p="http://schemas.openxmlformats.org/presentationml/2006/main">
   <p:cSld>
@@ -18121,7 +18730,7 @@
             </a:r>
             <a:r>
               <a:rPr/>
-              <a:t>(1</a:t>
+              <a:t>(2</a:t>
             </a:r>
             <a:r>
               <a:rPr/>
@@ -18164,13 +18773,15 @@
               <a:rPr sz="1800">
                 <a:latin typeface="Courier"/>
               </a:rPr>
-              <a:t>1    data test_example;
-2     input x y;
-3     cards;
-NOTE: The data set WORK.TEST_EXAMPLE has 3 observations and 2 variables.
-NOTE: DATA statement used (Total process time):
-      real time           0.51 seconds
-      cpu time            0.04 seconds</a:t>
+              <a:t>9    proc means data=test_example;
+10     var x y;
+11     title "Descriptive statistics";
+12   run;
+NOTE: Writing HTML Body file: sashtml.htm
+NOTE: There were 3 observations read from the data set WORK.TEST_EXAMPLE.
+NOTE: PROCEDURE MEANS used (Total process time):
+      real time           1.72 seconds
+      cpu time            0.20 seconds</a:t>
             </a:r>
           </a:p>
         </p:txBody>
@@ -18217,39 +18828,31 @@
             </a:pPr>
             <a:r>
               <a:rPr/>
-              <a:t>Log</a:t>
-            </a:r>
-            <a:r>
-              <a:rPr/>
-              <a:t> </a:t>
-            </a:r>
-            <a:r>
-              <a:rPr/>
-              <a:t>messages</a:t>
-            </a:r>
-            <a:r>
-              <a:rPr/>
-              <a:t> </a:t>
-            </a:r>
-            <a:r>
-              <a:rPr/>
-              <a:t>(2</a:t>
-            </a:r>
-            <a:r>
-              <a:rPr/>
-              <a:t> </a:t>
-            </a:r>
-            <a:r>
-              <a:rPr/>
-              <a:t>of</a:t>
-            </a:r>
-            <a:r>
-              <a:rPr/>
-              <a:t> </a:t>
-            </a:r>
-            <a:r>
-              <a:rPr/>
-              <a:t>2)</a:t>
+              <a:t>Where</a:t>
+            </a:r>
+            <a:r>
+              <a:rPr/>
+              <a:t> </a:t>
+            </a:r>
+            <a:r>
+              <a:rPr/>
+              <a:t>is</a:t>
+            </a:r>
+            <a:r>
+              <a:rPr/>
+              <a:t> </a:t>
+            </a:r>
+            <a:r>
+              <a:rPr/>
+              <a:t>the</a:t>
+            </a:r>
+            <a:r>
+              <a:rPr/>
+              <a:t> </a:t>
+            </a:r>
+            <a:r>
+              <a:rPr/>
+              <a:t>output?</a:t>
             </a:r>
           </a:p>
         </p:txBody>
@@ -18269,22 +18872,33 @@
           <a:bodyPr/>
           <a:lstStyle/>
           <a:p>
-            <a:pPr lvl="0" marL="1270000" indent="0">
+            <a:pPr lvl="0" marL="0" indent="0">
               <a:buNone/>
             </a:pPr>
             <a:r>
-              <a:rPr sz="1800">
-                <a:latin typeface="Courier"/>
-              </a:rPr>
-              <a:t>9    proc means data=test_example;
-10     var x y;
-11     title "Descriptive statistics";
-12   run;
-NOTE: Writing HTML Body file: sashtml.htm
-NOTE: There were 3 observations read from the data set WORK.TEST_EXAMPLE.
-NOTE: PROCEDURE MEANS used (Total process time):
-      real time           1.72 seconds
-      cpu time            0.20 seconds</a:t>
+              <a:rPr/>
+              <a:t>SAS has several options for storing output.</a:t>
+            </a:r>
+          </a:p>
+          <a:p>
+            <a:pPr lvl="1"/>
+            <a:r>
+              <a:rPr/>
+              <a:t>In the output window</a:t>
+            </a:r>
+          </a:p>
+          <a:p>
+            <a:pPr lvl="1"/>
+            <a:r>
+              <a:rPr/>
+              <a:t>As an html file</a:t>
+            </a:r>
+          </a:p>
+          <a:p>
+            <a:pPr lvl="1"/>
+            <a:r>
+              <a:rPr/>
+              <a:t>As a pdf file</a:t>
             </a:r>
           </a:p>
         </p:txBody>
@@ -18295,208 +18909,6 @@
 </file>
 
 <file path=ppt/slides/slide19.xml><?xml version="1.0" encoding="utf-8"?>
-<p:sld xmlns:a="http://schemas.openxmlformats.org/drawingml/2006/main" xmlns:r="http://schemas.openxmlformats.org/officeDocument/2006/relationships" xmlns:p="http://schemas.openxmlformats.org/presentationml/2006/main">
-  <p:cSld>
-    <p:spTree>
-      <p:nvGrpSpPr>
-        <p:cNvPr id="1" name=""/>
-        <p:cNvGrpSpPr/>
-        <p:nvPr/>
-      </p:nvGrpSpPr>
-      <p:grpSpPr>
-        <a:xfrm>
-          <a:off x="0" y="0"/>
-          <a:ext cx="0" cy="0"/>
-          <a:chOff x="0" y="0"/>
-          <a:chExt cx="0" cy="0"/>
-        </a:xfrm>
-      </p:grpSpPr>
-      <p:sp>
-        <p:nvSpPr>
-          <p:cNvPr id="2" name="Title 1"/>
-          <p:cNvSpPr>
-            <a:spLocks noGrp="1"/>
-          </p:cNvSpPr>
-          <p:nvPr>
-            <p:ph type="title"/>
-          </p:nvPr>
-        </p:nvSpPr>
-        <p:spPr/>
-        <p:txBody>
-          <a:bodyPr/>
-          <a:lstStyle/>
-          <a:p>
-            <a:pPr lvl="0" marL="0" indent="0">
-              <a:buNone/>
-            </a:pPr>
-            <a:r>
-              <a:rPr/>
-              <a:t>Where</a:t>
-            </a:r>
-            <a:r>
-              <a:rPr/>
-              <a:t> </a:t>
-            </a:r>
-            <a:r>
-              <a:rPr/>
-              <a:t>is</a:t>
-            </a:r>
-            <a:r>
-              <a:rPr/>
-              <a:t> </a:t>
-            </a:r>
-            <a:r>
-              <a:rPr/>
-              <a:t>the</a:t>
-            </a:r>
-            <a:r>
-              <a:rPr/>
-              <a:t> </a:t>
-            </a:r>
-            <a:r>
-              <a:rPr/>
-              <a:t>output?</a:t>
-            </a:r>
-          </a:p>
-        </p:txBody>
-      </p:sp>
-      <p:sp>
-        <p:nvSpPr>
-          <p:cNvPr id="3" name="Content Placeholder 2"/>
-          <p:cNvSpPr>
-            <a:spLocks noGrp="1"/>
-          </p:cNvSpPr>
-          <p:nvPr>
-            <p:ph idx="1"/>
-          </p:nvPr>
-        </p:nvSpPr>
-        <p:spPr/>
-        <p:txBody>
-          <a:bodyPr/>
-          <a:lstStyle/>
-          <a:p>
-            <a:pPr lvl="0" marL="0" indent="0">
-              <a:buNone/>
-            </a:pPr>
-            <a:r>
-              <a:rPr/>
-              <a:t>SAS has several options for storing output.</a:t>
-            </a:r>
-          </a:p>
-          <a:p>
-            <a:pPr lvl="1"/>
-            <a:r>
-              <a:rPr/>
-              <a:t>In the output window</a:t>
-            </a:r>
-          </a:p>
-          <a:p>
-            <a:pPr lvl="1"/>
-            <a:r>
-              <a:rPr/>
-              <a:t>As an html file</a:t>
-            </a:r>
-          </a:p>
-          <a:p>
-            <a:pPr lvl="1"/>
-            <a:r>
-              <a:rPr/>
-              <a:t>As a pdf file</a:t>
-            </a:r>
-          </a:p>
-        </p:txBody>
-      </p:sp>
-    </p:spTree>
-  </p:cSld>
-</p:sld>
-</file>
-
-<file path=ppt/slides/slide2.xml><?xml version="1.0" encoding="utf-8"?>
-<p:sld xmlns:a="http://schemas.openxmlformats.org/drawingml/2006/main" xmlns:r="http://schemas.openxmlformats.org/officeDocument/2006/relationships" xmlns:p="http://schemas.openxmlformats.org/presentationml/2006/main">
-  <p:cSld>
-    <p:spTree>
-      <p:nvGrpSpPr>
-        <p:cNvPr id="1" name=""/>
-        <p:cNvGrpSpPr/>
-        <p:nvPr/>
-      </p:nvGrpSpPr>
-      <p:grpSpPr>
-        <a:xfrm>
-          <a:off x="0" y="0"/>
-          <a:ext cx="0" cy="0"/>
-          <a:chOff x="0" y="0"/>
-          <a:chExt cx="0" cy="0"/>
-        </a:xfrm>
-      </p:grpSpPr>
-      <p:sp>
-        <p:nvSpPr>
-          <p:cNvPr id="2" name="Title 1"/>
-          <p:cNvSpPr>
-            <a:spLocks noGrp="1"/>
-          </p:cNvSpPr>
-          <p:nvPr>
-            <p:ph type="title"/>
-          </p:nvPr>
-        </p:nvSpPr>
-        <p:spPr/>
-        <p:txBody>
-          <a:bodyPr/>
-          <a:lstStyle/>
-          <a:p>
-            <a:pPr lvl="0" marL="0" indent="0">
-              <a:buNone/>
-            </a:pPr>
-            <a:r>
-              <a:rPr/>
-              <a:t>Test</a:t>
-            </a:r>
-            <a:r>
-              <a:rPr/>
-              <a:t> </a:t>
-            </a:r>
-            <a:r>
-              <a:rPr/>
-              <a:t>image</a:t>
-            </a:r>
-          </a:p>
-        </p:txBody>
-      </p:sp>
-      <p:pic>
-        <p:nvPicPr>
-          <p:cNvPr descr="../images/blog.png" id="0" name="Picture 1"/>
-          <p:cNvPicPr>
-            <a:picLocks noGrp="1" noChangeAspect="1"/>
-          </p:cNvPicPr>
-          <p:nvPr/>
-        </p:nvPicPr>
-        <p:blipFill>
-          <a:blip r:embed="rId2"/>
-          <a:stretch>
-            <a:fillRect/>
-          </a:stretch>
-        </p:blipFill>
-        <p:spPr bwMode="auto">
-          <a:xfrm>
-            <a:off x="1879600" y="1600200"/>
-            <a:ext cx="5384800" cy="4521200"/>
-          </a:xfrm>
-          <a:prstGeom prst="rect">
-            <a:avLst/>
-          </a:prstGeom>
-          <a:noFill/>
-          <a:ln w="9525">
-            <a:noFill/>
-            <a:headEnd/>
-            <a:tailEnd/>
-          </a:ln>
-        </p:spPr>
-      </p:pic>
-    </p:spTree>
-  </p:cSld>
-</p:sld>
-</file>
-
-<file path=ppt/slides/slide20.xml><?xml version="1.0" encoding="utf-8"?>
 <p:sld xmlns:a="http://schemas.openxmlformats.org/drawingml/2006/main" xmlns:r="http://schemas.openxmlformats.org/officeDocument/2006/relationships" xmlns:p="http://schemas.openxmlformats.org/presentationml/2006/main">
   <p:cSld>
     <p:spTree>
@@ -18627,7 +19039,89 @@
 </p:sld>
 </file>
 
-<file path=ppt/slides/slide21.xml><?xml version="1.0" encoding="utf-8"?>
+<file path=ppt/slides/slide2.xml><?xml version="1.0" encoding="utf-8"?>
+<p:sld xmlns:a="http://schemas.openxmlformats.org/drawingml/2006/main" xmlns:r="http://schemas.openxmlformats.org/officeDocument/2006/relationships" xmlns:p="http://schemas.openxmlformats.org/presentationml/2006/main">
+  <p:cSld>
+    <p:spTree>
+      <p:nvGrpSpPr>
+        <p:cNvPr id="1" name=""/>
+        <p:cNvGrpSpPr/>
+        <p:nvPr/>
+      </p:nvGrpSpPr>
+      <p:grpSpPr>
+        <a:xfrm>
+          <a:off x="0" y="0"/>
+          <a:ext cx="0" cy="0"/>
+          <a:chOff x="0" y="0"/>
+          <a:chExt cx="0" cy="0"/>
+        </a:xfrm>
+      </p:grpSpPr>
+      <p:sp>
+        <p:nvSpPr>
+          <p:cNvPr id="2" name="Title 1"/>
+          <p:cNvSpPr>
+            <a:spLocks noGrp="1"/>
+          </p:cNvSpPr>
+          <p:nvPr>
+            <p:ph type="title"/>
+          </p:nvPr>
+        </p:nvSpPr>
+        <p:spPr/>
+        <p:txBody>
+          <a:bodyPr/>
+          <a:lstStyle/>
+          <a:p>
+            <a:pPr lvl="0" marL="0" indent="0">
+              <a:buNone/>
+            </a:pPr>
+            <a:r>
+              <a:rPr/>
+              <a:t>Documentation</a:t>
+            </a:r>
+          </a:p>
+        </p:txBody>
+      </p:sp>
+      <p:sp>
+        <p:nvSpPr>
+          <p:cNvPr id="3" name="Content Placeholder 2"/>
+          <p:cNvSpPr>
+            <a:spLocks noGrp="1"/>
+          </p:cNvSpPr>
+          <p:nvPr>
+            <p:ph idx="1"/>
+          </p:nvPr>
+        </p:nvSpPr>
+        <p:spPr/>
+        <p:txBody>
+          <a:bodyPr/>
+          <a:lstStyle/>
+          <a:p>
+            <a:pPr lvl="0" marL="0" indent="0">
+              <a:buNone/>
+            </a:pPr>
+            <a:r>
+              <a:rPr/>
+              <a:t>This PowerPoint presentation was written by Steve Simon in 2018-08-29 and was last modified on 2020-06-27. It uses R Markdown, though the actual R code is fairly minimal. You can find the file that created this presentation on my </a:t>
+            </a:r>
+            <a:r>
+              <a:rPr>
+                <a:hlinkClick r:id="rId3"/>
+              </a:rPr>
+              <a:t>github repository</a:t>
+            </a:r>
+            <a:r>
+              <a:rPr/>
+              <a:t>.</a:t>
+            </a:r>
+          </a:p>
+        </p:txBody>
+      </p:sp>
+    </p:spTree>
+  </p:cSld>
+</p:sld>
+</file>
+
+<file path=ppt/slides/slide20.xml><?xml version="1.0" encoding="utf-8"?>
 <p:sld xmlns:a="http://schemas.openxmlformats.org/drawingml/2006/main" xmlns:r="http://schemas.openxmlformats.org/officeDocument/2006/relationships" xmlns:p="http://schemas.openxmlformats.org/presentationml/2006/main">
   <p:cSld>
     <p:spTree>
@@ -18790,7 +19284,7 @@
 </p:sld>
 </file>
 
-<file path=ppt/slides/slide22.xml><?xml version="1.0" encoding="utf-8"?>
+<file path=ppt/slides/slide21.xml><?xml version="1.0" encoding="utf-8"?>
 <p:sld xmlns:a="http://schemas.openxmlformats.org/drawingml/2006/main" xmlns:r="http://schemas.openxmlformats.org/officeDocument/2006/relationships" xmlns:p="http://schemas.openxmlformats.org/presentationml/2006/main">
   <p:cSld>
     <p:spTree>
@@ -18945,7 +19439,7 @@
 </p:sld>
 </file>
 
-<file path=ppt/slides/slide23.xml><?xml version="1.0" encoding="utf-8"?>
+<file path=ppt/slides/slide22.xml><?xml version="1.0" encoding="utf-8"?>
 <p:sld xmlns:a="http://schemas.openxmlformats.org/drawingml/2006/main" xmlns:r="http://schemas.openxmlformats.org/officeDocument/2006/relationships" xmlns:p="http://schemas.openxmlformats.org/presentationml/2006/main">
   <p:cSld>
     <p:spTree>
@@ -19188,7 +19682,7 @@
 </p:sld>
 </file>
 
-<file path=ppt/slides/slide24.xml><?xml version="1.0" encoding="utf-8"?>
+<file path=ppt/slides/slide23.xml><?xml version="1.0" encoding="utf-8"?>
 <p:sld xmlns:a="http://schemas.openxmlformats.org/drawingml/2006/main" xmlns:r="http://schemas.openxmlformats.org/officeDocument/2006/relationships" xmlns:p="http://schemas.openxmlformats.org/presentationml/2006/main">
   <p:cSld>
     <p:spTree>
@@ -19399,7 +19893,7 @@
 </p:sld>
 </file>
 
-<file path=ppt/slides/slide25.xml><?xml version="1.0" encoding="utf-8"?>
+<file path=ppt/slides/slide24.xml><?xml version="1.0" encoding="utf-8"?>
 <p:sld xmlns:a="http://schemas.openxmlformats.org/drawingml/2006/main" xmlns:r="http://schemas.openxmlformats.org/officeDocument/2006/relationships" xmlns:p="http://schemas.openxmlformats.org/presentationml/2006/main">
   <p:cSld>
     <p:spTree>
@@ -19610,7 +20104,7 @@
 </p:sld>
 </file>
 
-<file path=ppt/slides/slide26.xml><?xml version="1.0" encoding="utf-8"?>
+<file path=ppt/slides/slide25.xml><?xml version="1.0" encoding="utf-8"?>
 <p:sld xmlns:a="http://schemas.openxmlformats.org/drawingml/2006/main" xmlns:r="http://schemas.openxmlformats.org/officeDocument/2006/relationships" xmlns:p="http://schemas.openxmlformats.org/presentationml/2006/main">
   <p:cSld>
     <p:spTree>
@@ -19751,7 +20245,7 @@
 </p:sld>
 </file>
 
-<file path=ppt/slides/slide27.xml><?xml version="1.0" encoding="utf-8"?>
+<file path=ppt/slides/slide26.xml><?xml version="1.0" encoding="utf-8"?>
 <p:sld xmlns:a="http://schemas.openxmlformats.org/drawingml/2006/main" xmlns:r="http://schemas.openxmlformats.org/officeDocument/2006/relationships" xmlns:p="http://schemas.openxmlformats.org/presentationml/2006/main">
   <p:cSld>
     <p:spTree>
@@ -19906,7 +20400,7 @@
 </p:sld>
 </file>
 
-<file path=ppt/slides/slide28.xml><?xml version="1.0" encoding="utf-8"?>
+<file path=ppt/slides/slide27.xml><?xml version="1.0" encoding="utf-8"?>
 <p:sld xmlns:a="http://schemas.openxmlformats.org/drawingml/2006/main" xmlns:r="http://schemas.openxmlformats.org/officeDocument/2006/relationships" xmlns:p="http://schemas.openxmlformats.org/presentationml/2006/main">
   <p:cSld>
     <p:spTree>
@@ -20012,7 +20506,7 @@
 </p:sld>
 </file>
 
-<file path=ppt/slides/slide29.xml><?xml version="1.0" encoding="utf-8"?>
+<file path=ppt/slides/slide28.xml><?xml version="1.0" encoding="utf-8"?>
 <p:sld xmlns:a="http://schemas.openxmlformats.org/drawingml/2006/main" xmlns:r="http://schemas.openxmlformats.org/officeDocument/2006/relationships" xmlns:p="http://schemas.openxmlformats.org/presentationml/2006/main">
   <p:cSld>
     <p:spTree>
@@ -20049,6 +20543,15 @@
             </a:pPr>
             <a:r>
               <a:rPr/>
+              <a:t>[[Speaker notes]]</a:t>
+            </a:r>
+          </a:p>
+          <a:p>
+            <a:pPr lvl="0" marL="0" indent="0">
+              <a:buNone/>
+            </a:pPr>
+            <a:r>
+              <a:rPr/>
               <a:t>Here is the log window. Notice that the counts for errors, warnings, and notes appear at the top, and a missing count means zero errors and zero warnings. Hooray!</a:t>
             </a:r>
           </a:p>
@@ -20059,89 +20562,7 @@
 </p:sld>
 </file>
 
-<file path=ppt/slides/slide3.xml><?xml version="1.0" encoding="utf-8"?>
-<p:sld xmlns:a="http://schemas.openxmlformats.org/drawingml/2006/main" xmlns:r="http://schemas.openxmlformats.org/officeDocument/2006/relationships" xmlns:p="http://schemas.openxmlformats.org/presentationml/2006/main">
-  <p:cSld>
-    <p:spTree>
-      <p:nvGrpSpPr>
-        <p:cNvPr id="1" name=""/>
-        <p:cNvGrpSpPr/>
-        <p:nvPr/>
-      </p:nvGrpSpPr>
-      <p:grpSpPr>
-        <a:xfrm>
-          <a:off x="0" y="0"/>
-          <a:ext cx="0" cy="0"/>
-          <a:chOff x="0" y="0"/>
-          <a:chExt cx="0" cy="0"/>
-        </a:xfrm>
-      </p:grpSpPr>
-      <p:sp>
-        <p:nvSpPr>
-          <p:cNvPr id="2" name="Title 1"/>
-          <p:cNvSpPr>
-            <a:spLocks noGrp="1"/>
-          </p:cNvSpPr>
-          <p:nvPr>
-            <p:ph type="title"/>
-          </p:nvPr>
-        </p:nvSpPr>
-        <p:spPr/>
-        <p:txBody>
-          <a:bodyPr/>
-          <a:lstStyle/>
-          <a:p>
-            <a:pPr lvl="0" marL="0" indent="0">
-              <a:buNone/>
-            </a:pPr>
-            <a:r>
-              <a:rPr/>
-              <a:t>Documentation</a:t>
-            </a:r>
-          </a:p>
-        </p:txBody>
-      </p:sp>
-      <p:sp>
-        <p:nvSpPr>
-          <p:cNvPr id="3" name="Content Placeholder 2"/>
-          <p:cNvSpPr>
-            <a:spLocks noGrp="1"/>
-          </p:cNvSpPr>
-          <p:nvPr>
-            <p:ph idx="1"/>
-          </p:nvPr>
-        </p:nvSpPr>
-        <p:spPr/>
-        <p:txBody>
-          <a:bodyPr/>
-          <a:lstStyle/>
-          <a:p>
-            <a:pPr lvl="0" marL="0" indent="0">
-              <a:buNone/>
-            </a:pPr>
-            <a:r>
-              <a:rPr/>
-              <a:t>This PowerPoint presentation was written by Steve Simon in 2018-08-29 and was last modified on 2020-06-26. It uses R Markdown, though the actual R code is fairly minimal. You can find the file that created this presentation on my </a:t>
-            </a:r>
-            <a:r>
-              <a:rPr>
-                <a:hlinkClick r:id="rId3"/>
-              </a:rPr>
-              <a:t>github repository</a:t>
-            </a:r>
-            <a:r>
-              <a:rPr/>
-              <a:t>.</a:t>
-            </a:r>
-          </a:p>
-        </p:txBody>
-      </p:sp>
-    </p:spTree>
-  </p:cSld>
-</p:sld>
-</file>
-
-<file path=ppt/slides/slide30.xml><?xml version="1.0" encoding="utf-8"?>
+<file path=ppt/slides/slide29.xml><?xml version="1.0" encoding="utf-8"?>
 <p:sld xmlns:a="http://schemas.openxmlformats.org/drawingml/2006/main" xmlns:r="http://schemas.openxmlformats.org/officeDocument/2006/relationships" xmlns:p="http://schemas.openxmlformats.org/presentationml/2006/main">
   <p:cSld>
     <p:spTree>
@@ -20288,7 +20709,108 @@
 </p:sld>
 </file>
 
-<file path=ppt/slides/slide31.xml><?xml version="1.0" encoding="utf-8"?>
+<file path=ppt/slides/slide3.xml><?xml version="1.0" encoding="utf-8"?>
+<p:sld xmlns:a="http://schemas.openxmlformats.org/drawingml/2006/main" xmlns:r="http://schemas.openxmlformats.org/officeDocument/2006/relationships" xmlns:p="http://schemas.openxmlformats.org/presentationml/2006/main">
+  <p:cSld>
+    <p:spTree>
+      <p:nvGrpSpPr>
+        <p:cNvPr id="1" name=""/>
+        <p:cNvGrpSpPr/>
+        <p:nvPr/>
+      </p:nvGrpSpPr>
+      <p:grpSpPr>
+        <a:xfrm>
+          <a:off x="0" y="0"/>
+          <a:ext cx="0" cy="0"/>
+          <a:chOff x="0" y="0"/>
+          <a:chExt cx="0" cy="0"/>
+        </a:xfrm>
+      </p:grpSpPr>
+      <p:sp>
+        <p:nvSpPr>
+          <p:cNvPr id="2" name="Title 1"/>
+          <p:cNvSpPr>
+            <a:spLocks noGrp="1"/>
+          </p:cNvSpPr>
+          <p:nvPr>
+            <p:ph type="title"/>
+          </p:nvPr>
+        </p:nvSpPr>
+        <p:spPr/>
+        <p:txBody>
+          <a:bodyPr/>
+          <a:lstStyle/>
+          <a:p>
+            <a:pPr lvl="0" marL="0" indent="0">
+              <a:buNone/>
+            </a:pPr>
+            <a:r>
+              <a:rPr/>
+              <a:t>Course</a:t>
+            </a:r>
+            <a:r>
+              <a:rPr/>
+              <a:t> </a:t>
+            </a:r>
+            <a:r>
+              <a:rPr/>
+              <a:t>instructor,</a:t>
+            </a:r>
+            <a:r>
+              <a:rPr/>
+              <a:t> </a:t>
+            </a:r>
+            <a:r>
+              <a:rPr/>
+              <a:t>Steve</a:t>
+            </a:r>
+            <a:r>
+              <a:rPr/>
+              <a:t> </a:t>
+            </a:r>
+            <a:r>
+              <a:rPr/>
+              <a:t>Simon</a:t>
+            </a:r>
+          </a:p>
+        </p:txBody>
+      </p:sp>
+      <p:pic>
+        <p:nvPicPr>
+          <p:cNvPr descr="../images/SteveSimonPic.jpg" id="0" name="Picture 1"/>
+          <p:cNvPicPr>
+            <a:picLocks noGrp="1" noChangeAspect="1"/>
+          </p:cNvPicPr>
+          <p:nvPr/>
+        </p:nvPicPr>
+        <p:blipFill>
+          <a:blip r:embed="rId3"/>
+          <a:stretch>
+            <a:fillRect/>
+          </a:stretch>
+        </p:blipFill>
+        <p:spPr bwMode="auto">
+          <a:xfrm>
+            <a:off x="2794000" y="1600200"/>
+            <a:ext cx="3543300" cy="4521200"/>
+          </a:xfrm>
+          <a:prstGeom prst="rect">
+            <a:avLst/>
+          </a:prstGeom>
+          <a:noFill/>
+          <a:ln w="9525">
+            <a:noFill/>
+            <a:headEnd/>
+            <a:tailEnd/>
+          </a:ln>
+        </p:spPr>
+      </p:pic>
+    </p:spTree>
+  </p:cSld>
+</p:sld>
+</file>
+
+<file path=ppt/slides/slide30.xml><?xml version="1.0" encoding="utf-8"?>
 <p:sld xmlns:a="http://schemas.openxmlformats.org/drawingml/2006/main" xmlns:r="http://schemas.openxmlformats.org/officeDocument/2006/relationships" xmlns:p="http://schemas.openxmlformats.org/presentationml/2006/main">
   <p:cSld>
     <p:spTree>
@@ -20427,107 +20949,6 @@
             </a:pPr>
             <a:r>
               <a:rPr/>
-              <a:t>Course</a:t>
-            </a:r>
-            <a:r>
-              <a:rPr/>
-              <a:t> </a:t>
-            </a:r>
-            <a:r>
-              <a:rPr/>
-              <a:t>instructor,</a:t>
-            </a:r>
-            <a:r>
-              <a:rPr/>
-              <a:t> </a:t>
-            </a:r>
-            <a:r>
-              <a:rPr/>
-              <a:t>Steve</a:t>
-            </a:r>
-            <a:r>
-              <a:rPr/>
-              <a:t> </a:t>
-            </a:r>
-            <a:r>
-              <a:rPr/>
-              <a:t>Simon</a:t>
-            </a:r>
-          </a:p>
-        </p:txBody>
-      </p:sp>
-      <p:pic>
-        <p:nvPicPr>
-          <p:cNvPr descr="../images/SteveSimonPic.jpg" id="0" name="Picture 1"/>
-          <p:cNvPicPr>
-            <a:picLocks noGrp="1" noChangeAspect="1"/>
-          </p:cNvPicPr>
-          <p:nvPr/>
-        </p:nvPicPr>
-        <p:blipFill>
-          <a:blip r:embed="rId3"/>
-          <a:stretch>
-            <a:fillRect/>
-          </a:stretch>
-        </p:blipFill>
-        <p:spPr bwMode="auto">
-          <a:xfrm>
-            <a:off x="2794000" y="1600200"/>
-            <a:ext cx="3543300" cy="4521200"/>
-          </a:xfrm>
-          <a:prstGeom prst="rect">
-            <a:avLst/>
-          </a:prstGeom>
-          <a:noFill/>
-          <a:ln w="9525">
-            <a:noFill/>
-            <a:headEnd/>
-            <a:tailEnd/>
-          </a:ln>
-        </p:spPr>
-      </p:pic>
-    </p:spTree>
-  </p:cSld>
-</p:sld>
-</file>
-
-<file path=ppt/slides/slide5.xml><?xml version="1.0" encoding="utf-8"?>
-<p:sld xmlns:a="http://schemas.openxmlformats.org/drawingml/2006/main" xmlns:r="http://schemas.openxmlformats.org/officeDocument/2006/relationships" xmlns:p="http://schemas.openxmlformats.org/presentationml/2006/main">
-  <p:cSld>
-    <p:spTree>
-      <p:nvGrpSpPr>
-        <p:cNvPr id="1" name=""/>
-        <p:cNvGrpSpPr/>
-        <p:nvPr/>
-      </p:nvGrpSpPr>
-      <p:grpSpPr>
-        <a:xfrm>
-          <a:off x="0" y="0"/>
-          <a:ext cx="0" cy="0"/>
-          <a:chOff x="0" y="0"/>
-          <a:chExt cx="0" cy="0"/>
-        </a:xfrm>
-      </p:grpSpPr>
-      <p:sp>
-        <p:nvSpPr>
-          <p:cNvPr id="2" name="Title 1"/>
-          <p:cNvSpPr>
-            <a:spLocks noGrp="1"/>
-          </p:cNvSpPr>
-          <p:nvPr>
-            <p:ph type="title"/>
-          </p:nvPr>
-        </p:nvSpPr>
-        <p:spPr/>
-        <p:txBody>
-          <a:bodyPr/>
-          <a:lstStyle/>
-          <a:p>
-            <a:pPr lvl="0" marL="0" indent="0">
-              <a:buNone/>
-            </a:pPr>
-            <a:r>
-              <a:rPr/>
               <a:t>Where</a:t>
             </a:r>
             <a:r>
@@ -20656,7 +21077,7 @@
 </p:sld>
 </file>
 
-<file path=ppt/slides/slide6.xml><?xml version="1.0" encoding="utf-8"?>
+<file path=ppt/slides/slide5.xml><?xml version="1.0" encoding="utf-8"?>
 <p:sld xmlns:a="http://schemas.openxmlformats.org/drawingml/2006/main" xmlns:r="http://schemas.openxmlformats.org/officeDocument/2006/relationships" xmlns:p="http://schemas.openxmlformats.org/presentationml/2006/main">
   <p:cSld>
     <p:spTree>
@@ -20851,7 +21272,7 @@
 </p:sld>
 </file>
 
-<file path=ppt/slides/slide7.xml><?xml version="1.0" encoding="utf-8"?>
+<file path=ppt/slides/slide6.xml><?xml version="1.0" encoding="utf-8"?>
 <p:sld xmlns:a="http://schemas.openxmlformats.org/drawingml/2006/main" xmlns:r="http://schemas.openxmlformats.org/officeDocument/2006/relationships" xmlns:p="http://schemas.openxmlformats.org/presentationml/2006/main">
   <p:cSld>
     <p:spTree>
@@ -21062,6 +21483,102 @@
 </p:sld>
 </file>
 
+<file path=ppt/slides/slide7.xml><?xml version="1.0" encoding="utf-8"?>
+<p:sld xmlns:a="http://schemas.openxmlformats.org/drawingml/2006/main" xmlns:r="http://schemas.openxmlformats.org/officeDocument/2006/relationships" xmlns:p="http://schemas.openxmlformats.org/presentationml/2006/main">
+  <p:cSld>
+    <p:spTree>
+      <p:nvGrpSpPr>
+        <p:cNvPr id="1" name=""/>
+        <p:cNvGrpSpPr/>
+        <p:nvPr/>
+      </p:nvGrpSpPr>
+      <p:grpSpPr>
+        <a:xfrm>
+          <a:off x="0" y="0"/>
+          <a:ext cx="0" cy="0"/>
+          <a:chOff x="0" y="0"/>
+          <a:chExt cx="0" cy="0"/>
+        </a:xfrm>
+      </p:grpSpPr>
+      <p:sp>
+        <p:nvSpPr>
+          <p:cNvPr id="2" name="Title 1"/>
+          <p:cNvSpPr>
+            <a:spLocks noGrp="1"/>
+          </p:cNvSpPr>
+          <p:nvPr>
+            <p:ph type="title"/>
+          </p:nvPr>
+        </p:nvSpPr>
+        <p:spPr/>
+        <p:txBody>
+          <a:bodyPr/>
+          <a:lstStyle/>
+          <a:p>
+            <a:pPr lvl="0" marL="0" indent="0">
+              <a:buNone/>
+            </a:pPr>
+            <a:r>
+              <a:rPr/>
+              <a:t>SAS</a:t>
+            </a:r>
+            <a:r>
+              <a:rPr/>
+              <a:t> </a:t>
+            </a:r>
+            <a:r>
+              <a:rPr/>
+              <a:t>using</a:t>
+            </a:r>
+            <a:r>
+              <a:rPr/>
+              <a:t> </a:t>
+            </a:r>
+            <a:r>
+              <a:rPr/>
+              <a:t>SAS</a:t>
+            </a:r>
+            <a:r>
+              <a:rPr/>
+              <a:t> </a:t>
+            </a:r>
+            <a:r>
+              <a:rPr/>
+              <a:t>University</a:t>
+            </a:r>
+          </a:p>
+        </p:txBody>
+      </p:sp>
+      <p:sp>
+        <p:nvSpPr>
+          <p:cNvPr id="3" name="Content Placeholder 2"/>
+          <p:cNvSpPr>
+            <a:spLocks noGrp="1"/>
+          </p:cNvSpPr>
+          <p:nvPr>
+            <p:ph idx="1"/>
+          </p:nvPr>
+        </p:nvSpPr>
+        <p:spPr/>
+        <p:txBody>
+          <a:bodyPr/>
+          <a:lstStyle/>
+          <a:p>
+            <a:pPr lvl="0" marL="0" indent="0">
+              <a:buNone/>
+            </a:pPr>
+            <a:r>
+              <a:rPr/>
+              <a:t>[Screenshot of main page for SAS University]</a:t>
+            </a:r>
+          </a:p>
+        </p:txBody>
+      </p:sp>
+    </p:spTree>
+  </p:cSld>
+</p:sld>
+</file>
+
 <file path=ppt/slides/slide8.xml><?xml version="1.0" encoding="utf-8"?>
 <p:sld xmlns:a="http://schemas.openxmlformats.org/drawingml/2006/main" xmlns:r="http://schemas.openxmlformats.org/officeDocument/2006/relationships" xmlns:p="http://schemas.openxmlformats.org/presentationml/2006/main">
   <p:cSld>
@@ -21115,15 +21632,15 @@
             </a:r>
             <a:r>
               <a:rPr/>
-              <a:t>SAS</a:t>
-            </a:r>
-            <a:r>
-              <a:rPr/>
-              <a:t> </a:t>
-            </a:r>
-            <a:r>
-              <a:rPr/>
-              <a:t>University</a:t>
+              <a:t>Jupyter</a:t>
+            </a:r>
+            <a:r>
+              <a:rPr/>
+              <a:t> </a:t>
+            </a:r>
+            <a:r>
+              <a:rPr/>
+              <a:t>notebooks</a:t>
             </a:r>
           </a:p>
         </p:txBody>
@@ -21148,7 +21665,7 @@
             </a:pPr>
             <a:r>
               <a:rPr/>
-              <a:t>[Screenshot of main page for SAS University]</a:t>
+              <a:t>[Screenshot of SAS blog entry on Jupyter]</a:t>
             </a:r>
           </a:p>
         </p:txBody>
@@ -21211,15 +21728,15 @@
             </a:r>
             <a:r>
               <a:rPr/>
-              <a:t>Jupyter</a:t>
-            </a:r>
-            <a:r>
-              <a:rPr/>
-              <a:t> </a:t>
-            </a:r>
-            <a:r>
-              <a:rPr/>
-              <a:t>notebooks</a:t>
+              <a:t>SAS</a:t>
+            </a:r>
+            <a:r>
+              <a:rPr/>
+              <a:t> </a:t>
+            </a:r>
+            <a:r>
+              <a:rPr/>
+              <a:t>markdown</a:t>
             </a:r>
           </a:p>
         </p:txBody>
@@ -21244,7 +21761,7 @@
             </a:pPr>
             <a:r>
               <a:rPr/>
-              <a:t>[Screenshot of SAS blog entry on Jupyter]</a:t>
+              <a:t>[Screenshot of SAS markdown web page]</a:t>
             </a:r>
           </a:p>
         </p:txBody>

</xml_diff>